<commit_message>
add merge-push to README text
</commit_message>
<xml_diff>
--- a/session_1/20221018 ETH Denver S1 homework.pptx
+++ b/session_1/20221018 ETH Denver S1 homework.pptx
@@ -10622,7 +10622,7 @@
         </p:nvSpPr>
         <p:spPr>
           <a:xfrm>
-            <a:off x="5960396" y="1233025"/>
+            <a:off x="5960396" y="1412319"/>
             <a:ext cx="2698708" cy="1960623"/>
           </a:xfrm>
           <a:prstGeom prst="cloud">
@@ -10840,7 +10840,7 @@
         </p:nvSpPr>
         <p:spPr>
           <a:xfrm>
-            <a:off x="231060" y="2761337"/>
+            <a:off x="231060" y="2940631"/>
             <a:ext cx="1654326" cy="307777"/>
           </a:xfrm>
           <a:prstGeom prst="rect">
@@ -11059,7 +11059,7 @@
         </p:nvSpPr>
         <p:spPr>
           <a:xfrm>
-            <a:off x="215153" y="1208391"/>
+            <a:off x="215153" y="1387685"/>
             <a:ext cx="1586891" cy="523220"/>
           </a:xfrm>
           <a:prstGeom prst="rect">
@@ -11276,7 +11276,7 @@
         </p:nvSpPr>
         <p:spPr>
           <a:xfrm rot="10800000">
-            <a:off x="5722402" y="1296201"/>
+            <a:off x="5722402" y="1475495"/>
             <a:ext cx="237994" cy="2199296"/>
           </a:xfrm>
           <a:prstGeom prst="rightBrace">
@@ -11336,7 +11336,7 @@
         </p:blipFill>
         <p:spPr>
           <a:xfrm>
-            <a:off x="6875403" y="2244999"/>
+            <a:off x="6875403" y="2424293"/>
             <a:ext cx="888594" cy="909502"/>
           </a:xfrm>
           <a:prstGeom prst="rect">
@@ -11366,7 +11366,7 @@
         </p:blipFill>
         <p:spPr>
           <a:xfrm>
-            <a:off x="7699970" y="1742706"/>
+            <a:off x="7699970" y="1922000"/>
             <a:ext cx="1011518" cy="1079944"/>
           </a:xfrm>
           <a:prstGeom prst="rect">
@@ -11396,7 +11396,7 @@
         </p:blipFill>
         <p:spPr>
           <a:xfrm>
-            <a:off x="5983650" y="1706496"/>
+            <a:off x="5983650" y="1885790"/>
             <a:ext cx="1011518" cy="1035318"/>
           </a:xfrm>
           <a:prstGeom prst="rect">
@@ -11420,7 +11420,7 @@
         </p:nvSpPr>
         <p:spPr>
           <a:xfrm>
-            <a:off x="1997426" y="1222535"/>
+            <a:off x="1997426" y="1401829"/>
             <a:ext cx="3363468" cy="1092607"/>
           </a:xfrm>
           <a:prstGeom prst="rect">
@@ -11674,7 +11674,7 @@
         </p:nvSpPr>
         <p:spPr>
           <a:xfrm>
-            <a:off x="5352071" y="1305225"/>
+            <a:off x="5352071" y="1484519"/>
             <a:ext cx="237994" cy="2190272"/>
           </a:xfrm>
           <a:prstGeom prst="rightBrace">
@@ -11728,7 +11728,7 @@
         </p:nvSpPr>
         <p:spPr>
           <a:xfrm>
-            <a:off x="2063729" y="2549084"/>
+            <a:off x="2063729" y="2728378"/>
             <a:ext cx="3363468" cy="1169551"/>
           </a:xfrm>
           <a:prstGeom prst="rect">
@@ -12004,6 +12004,41 @@
                 <a:cs typeface="Arial" panose="020B0604020202020204" pitchFamily="34" charset="0"/>
               </a:rPr>
               <a:t>etc.</a:t>
+            </a:r>
+          </a:p>
+        </p:txBody>
+      </p:sp>
+      <p:sp>
+        <p:nvSpPr>
+          <p:cNvPr id="16" name="TextBox 15">
+            <a:extLst>
+              <a:ext uri="{FF2B5EF4-FFF2-40B4-BE49-F238E27FC236}">
+                <a16:creationId xmlns:a16="http://schemas.microsoft.com/office/drawing/2014/main" id="{28490D9C-207A-903E-B789-4D386DB42A6E}"/>
+              </a:ext>
+            </a:extLst>
+          </p:cNvPr>
+          <p:cNvSpPr txBox="1"/>
+          <p:nvPr/>
+        </p:nvSpPr>
+        <p:spPr>
+          <a:xfrm>
+            <a:off x="224116" y="948770"/>
+            <a:ext cx="4572000" cy="215444"/>
+          </a:xfrm>
+          <a:prstGeom prst="rect">
+            <a:avLst/>
+          </a:prstGeom>
+          <a:noFill/>
+        </p:spPr>
+        <p:txBody>
+          <a:bodyPr wrap="square">
+            <a:spAutoFit/>
+          </a:bodyPr>
+          <a:lstStyle/>
+          <a:p>
+            <a:r>
+              <a:rPr lang="en-LU" sz="800" dirty="0"/>
+              <a:t>https://www.hasbro.com/common/instruct/00009.pdf</a:t>
             </a:r>
           </a:p>
         </p:txBody>

</xml_diff>

<commit_message>
Add the big picture in Homework 2
</commit_message>
<xml_diff>
--- a/session_1/20221018 ETH Denver S1 homework.pptx
+++ b/session_1/20221018 ETH Denver S1 homework.pptx
@@ -5,20 +5,22 @@
     <p:sldMasterId id="2147483662" r:id="rId1"/>
   </p:sldMasterIdLst>
   <p:notesMasterIdLst>
-    <p:notesMasterId r:id="rId3"/>
+    <p:notesMasterId r:id="rId5"/>
   </p:notesMasterIdLst>
   <p:sldIdLst>
     <p:sldId id="260" r:id="rId2"/>
+    <p:sldId id="261" r:id="rId3"/>
+    <p:sldId id="262" r:id="rId4"/>
   </p:sldIdLst>
   <p:sldSz cx="9144000" cy="5143500" type="screen16x9"/>
   <p:notesSz cx="6858000" cy="9144000"/>
   <p:embeddedFontLst>
     <p:embeddedFont>
       <p:font typeface="Montserrat" pitchFamily="2" charset="77"/>
-      <p:regular r:id="rId4"/>
-      <p:bold r:id="rId5"/>
-      <p:italic r:id="rId6"/>
-      <p:boldItalic r:id="rId7"/>
+      <p:regular r:id="rId6"/>
+      <p:bold r:id="rId7"/>
+      <p:italic r:id="rId8"/>
+      <p:boldItalic r:id="rId9"/>
     </p:embeddedFont>
   </p:embeddedFontLst>
   <p:defaultTextStyle>
@@ -1036,6 +1038,400 @@
     <p:extLst>
       <p:ext uri="{BB962C8B-B14F-4D97-AF65-F5344CB8AC3E}">
         <p14:creationId xmlns:p14="http://schemas.microsoft.com/office/powerpoint/2010/main" val="1406434002"/>
+      </p:ext>
+    </p:extLst>
+  </p:cSld>
+  <p:clrMapOvr>
+    <a:masterClrMapping/>
+  </p:clrMapOvr>
+</p:notes>
+</file>
+
+<file path=ppt/notesSlides/notesSlide2.xml><?xml version="1.0" encoding="utf-8"?>
+<p:notes xmlns:a="http://schemas.openxmlformats.org/drawingml/2006/main" xmlns:r="http://schemas.openxmlformats.org/officeDocument/2006/relationships" xmlns:p="http://schemas.openxmlformats.org/presentationml/2006/main" showMasterSp="0" showMasterPhAnim="0">
+  <p:cSld>
+    <p:spTree>
+      <p:nvGrpSpPr>
+        <p:cNvPr id="1" name="Shape 66"/>
+        <p:cNvGrpSpPr/>
+        <p:nvPr/>
+      </p:nvGrpSpPr>
+      <p:grpSpPr>
+        <a:xfrm>
+          <a:off x="0" y="0"/>
+          <a:ext cx="0" cy="0"/>
+          <a:chOff x="0" y="0"/>
+          <a:chExt cx="0" cy="0"/>
+        </a:xfrm>
+      </p:grpSpPr>
+      <p:sp>
+        <p:nvSpPr>
+          <p:cNvPr id="67" name="Google Shape;67;p9:notes"/>
+          <p:cNvSpPr>
+            <a:spLocks noGrp="1" noRot="1" noChangeAspect="1"/>
+          </p:cNvSpPr>
+          <p:nvPr>
+            <p:ph type="sldImg" idx="2"/>
+          </p:nvPr>
+        </p:nvSpPr>
+        <p:spPr>
+          <a:xfrm>
+            <a:off x="685800" y="1143000"/>
+            <a:ext cx="5486400" cy="3086100"/>
+          </a:xfrm>
+          <a:custGeom>
+            <a:avLst/>
+            <a:gdLst/>
+            <a:ahLst/>
+            <a:cxnLst/>
+            <a:rect l="l" t="t" r="r" b="b"/>
+            <a:pathLst>
+              <a:path w="120000" h="120000" extrusionOk="0">
+                <a:moveTo>
+                  <a:pt x="0" y="0"/>
+                </a:moveTo>
+                <a:lnTo>
+                  <a:pt x="120000" y="0"/>
+                </a:lnTo>
+                <a:lnTo>
+                  <a:pt x="120000" y="120000"/>
+                </a:lnTo>
+                <a:lnTo>
+                  <a:pt x="0" y="120000"/>
+                </a:lnTo>
+                <a:close/>
+              </a:path>
+            </a:pathLst>
+          </a:custGeom>
+          <a:noFill/>
+          <a:ln w="12700" cap="flat" cmpd="sng">
+            <a:solidFill>
+              <a:srgbClr val="000000"/>
+            </a:solidFill>
+            <a:prstDash val="solid"/>
+            <a:round/>
+            <a:headEnd type="none" w="sm" len="sm"/>
+            <a:tailEnd type="none" w="sm" len="sm"/>
+          </a:ln>
+        </p:spPr>
+      </p:sp>
+      <p:sp>
+        <p:nvSpPr>
+          <p:cNvPr id="68" name="Google Shape;68;p9:notes"/>
+          <p:cNvSpPr txBox="1">
+            <a:spLocks noGrp="1"/>
+          </p:cNvSpPr>
+          <p:nvPr>
+            <p:ph type="body" idx="1"/>
+          </p:nvPr>
+        </p:nvSpPr>
+        <p:spPr>
+          <a:xfrm>
+            <a:off x="685800" y="4400550"/>
+            <a:ext cx="5486400" cy="3600600"/>
+          </a:xfrm>
+          <a:prstGeom prst="rect">
+            <a:avLst/>
+          </a:prstGeom>
+          <a:noFill/>
+          <a:ln>
+            <a:noFill/>
+          </a:ln>
+        </p:spPr>
+        <p:txBody>
+          <a:bodyPr spcFirstLastPara="1" wrap="square" lIns="91425" tIns="45700" rIns="91425" bIns="45700" anchor="t" anchorCtr="0">
+            <a:noAutofit/>
+          </a:bodyPr>
+          <a:lstStyle/>
+          <a:p>
+            <a:pPr marL="0" lvl="0" indent="0" algn="l" rtl="0">
+              <a:lnSpc>
+                <a:spcPct val="100000"/>
+              </a:lnSpc>
+              <a:spcBef>
+                <a:spcPts val="0"/>
+              </a:spcBef>
+              <a:spcAft>
+                <a:spcPts val="0"/>
+              </a:spcAft>
+              <a:buSzPts val="1100"/>
+              <a:buNone/>
+            </a:pPr>
+            <a:endParaRPr lang="en-GB" noProof="0" dirty="0"/>
+          </a:p>
+        </p:txBody>
+      </p:sp>
+      <p:sp>
+        <p:nvSpPr>
+          <p:cNvPr id="69" name="Google Shape;69;p9:notes"/>
+          <p:cNvSpPr txBox="1">
+            <a:spLocks noGrp="1"/>
+          </p:cNvSpPr>
+          <p:nvPr>
+            <p:ph type="sldNum" idx="12"/>
+          </p:nvPr>
+        </p:nvSpPr>
+        <p:spPr>
+          <a:xfrm>
+            <a:off x="3884613" y="8685213"/>
+            <a:ext cx="2971800" cy="458700"/>
+          </a:xfrm>
+          <a:prstGeom prst="rect">
+            <a:avLst/>
+          </a:prstGeom>
+          <a:noFill/>
+          <a:ln>
+            <a:noFill/>
+          </a:ln>
+        </p:spPr>
+        <p:txBody>
+          <a:bodyPr spcFirstLastPara="1" wrap="square" lIns="91425" tIns="45700" rIns="91425" bIns="45700" anchor="b" anchorCtr="0">
+            <a:noAutofit/>
+          </a:bodyPr>
+          <a:lstStyle/>
+          <a:p>
+            <a:pPr marL="0" marR="0" lvl="0" indent="0" algn="r" rtl="0">
+              <a:lnSpc>
+                <a:spcPct val="100000"/>
+              </a:lnSpc>
+              <a:spcBef>
+                <a:spcPts val="0"/>
+              </a:spcBef>
+              <a:spcAft>
+                <a:spcPts val="0"/>
+              </a:spcAft>
+              <a:buClr>
+                <a:srgbClr val="000000"/>
+              </a:buClr>
+              <a:buSzPts val="1400"/>
+              <a:buFont typeface="Arial"/>
+              <a:buNone/>
+            </a:pPr>
+            <a:fld id="{00000000-1234-1234-1234-123412341234}" type="slidenum">
+              <a:rPr lang="en" sz="1400" b="0" i="0" u="none" strike="noStrike" cap="none">
+                <a:solidFill>
+                  <a:srgbClr val="000000"/>
+                </a:solidFill>
+                <a:latin typeface="Arial"/>
+                <a:ea typeface="Arial"/>
+                <a:cs typeface="Arial"/>
+                <a:sym typeface="Arial"/>
+              </a:rPr>
+              <a:t>2</a:t>
+            </a:fld>
+            <a:endParaRPr sz="1400" b="0" i="0" u="none" strike="noStrike" cap="none">
+              <a:solidFill>
+                <a:srgbClr val="000000"/>
+              </a:solidFill>
+              <a:latin typeface="Arial"/>
+              <a:ea typeface="Arial"/>
+              <a:cs typeface="Arial"/>
+              <a:sym typeface="Arial"/>
+            </a:endParaRPr>
+          </a:p>
+        </p:txBody>
+      </p:sp>
+    </p:spTree>
+    <p:extLst>
+      <p:ext uri="{BB962C8B-B14F-4D97-AF65-F5344CB8AC3E}">
+        <p14:creationId xmlns:p14="http://schemas.microsoft.com/office/powerpoint/2010/main" val="2810830098"/>
+      </p:ext>
+    </p:extLst>
+  </p:cSld>
+  <p:clrMapOvr>
+    <a:masterClrMapping/>
+  </p:clrMapOvr>
+</p:notes>
+</file>
+
+<file path=ppt/notesSlides/notesSlide3.xml><?xml version="1.0" encoding="utf-8"?>
+<p:notes xmlns:a="http://schemas.openxmlformats.org/drawingml/2006/main" xmlns:r="http://schemas.openxmlformats.org/officeDocument/2006/relationships" xmlns:p="http://schemas.openxmlformats.org/presentationml/2006/main" showMasterSp="0" showMasterPhAnim="0">
+  <p:cSld>
+    <p:spTree>
+      <p:nvGrpSpPr>
+        <p:cNvPr id="1" name="Shape 66"/>
+        <p:cNvGrpSpPr/>
+        <p:nvPr/>
+      </p:nvGrpSpPr>
+      <p:grpSpPr>
+        <a:xfrm>
+          <a:off x="0" y="0"/>
+          <a:ext cx="0" cy="0"/>
+          <a:chOff x="0" y="0"/>
+          <a:chExt cx="0" cy="0"/>
+        </a:xfrm>
+      </p:grpSpPr>
+      <p:sp>
+        <p:nvSpPr>
+          <p:cNvPr id="67" name="Google Shape;67;p9:notes"/>
+          <p:cNvSpPr>
+            <a:spLocks noGrp="1" noRot="1" noChangeAspect="1"/>
+          </p:cNvSpPr>
+          <p:nvPr>
+            <p:ph type="sldImg" idx="2"/>
+          </p:nvPr>
+        </p:nvSpPr>
+        <p:spPr>
+          <a:xfrm>
+            <a:off x="685800" y="1143000"/>
+            <a:ext cx="5486400" cy="3086100"/>
+          </a:xfrm>
+          <a:custGeom>
+            <a:avLst/>
+            <a:gdLst/>
+            <a:ahLst/>
+            <a:cxnLst/>
+            <a:rect l="l" t="t" r="r" b="b"/>
+            <a:pathLst>
+              <a:path w="120000" h="120000" extrusionOk="0">
+                <a:moveTo>
+                  <a:pt x="0" y="0"/>
+                </a:moveTo>
+                <a:lnTo>
+                  <a:pt x="120000" y="0"/>
+                </a:lnTo>
+                <a:lnTo>
+                  <a:pt x="120000" y="120000"/>
+                </a:lnTo>
+                <a:lnTo>
+                  <a:pt x="0" y="120000"/>
+                </a:lnTo>
+                <a:close/>
+              </a:path>
+            </a:pathLst>
+          </a:custGeom>
+          <a:noFill/>
+          <a:ln w="12700" cap="flat" cmpd="sng">
+            <a:solidFill>
+              <a:srgbClr val="000000"/>
+            </a:solidFill>
+            <a:prstDash val="solid"/>
+            <a:round/>
+            <a:headEnd type="none" w="sm" len="sm"/>
+            <a:tailEnd type="none" w="sm" len="sm"/>
+          </a:ln>
+        </p:spPr>
+      </p:sp>
+      <p:sp>
+        <p:nvSpPr>
+          <p:cNvPr id="68" name="Google Shape;68;p9:notes"/>
+          <p:cNvSpPr txBox="1">
+            <a:spLocks noGrp="1"/>
+          </p:cNvSpPr>
+          <p:nvPr>
+            <p:ph type="body" idx="1"/>
+          </p:nvPr>
+        </p:nvSpPr>
+        <p:spPr>
+          <a:xfrm>
+            <a:off x="685800" y="4400550"/>
+            <a:ext cx="5486400" cy="3600600"/>
+          </a:xfrm>
+          <a:prstGeom prst="rect">
+            <a:avLst/>
+          </a:prstGeom>
+          <a:noFill/>
+          <a:ln>
+            <a:noFill/>
+          </a:ln>
+        </p:spPr>
+        <p:txBody>
+          <a:bodyPr spcFirstLastPara="1" wrap="square" lIns="91425" tIns="45700" rIns="91425" bIns="45700" anchor="t" anchorCtr="0">
+            <a:noAutofit/>
+          </a:bodyPr>
+          <a:lstStyle/>
+          <a:p>
+            <a:pPr marL="0" lvl="0" indent="0" algn="l" rtl="0">
+              <a:lnSpc>
+                <a:spcPct val="100000"/>
+              </a:lnSpc>
+              <a:spcBef>
+                <a:spcPts val="0"/>
+              </a:spcBef>
+              <a:spcAft>
+                <a:spcPts val="0"/>
+              </a:spcAft>
+              <a:buSzPts val="1100"/>
+              <a:buNone/>
+            </a:pPr>
+            <a:endParaRPr lang="en-GB" noProof="0" dirty="0"/>
+          </a:p>
+        </p:txBody>
+      </p:sp>
+      <p:sp>
+        <p:nvSpPr>
+          <p:cNvPr id="69" name="Google Shape;69;p9:notes"/>
+          <p:cNvSpPr txBox="1">
+            <a:spLocks noGrp="1"/>
+          </p:cNvSpPr>
+          <p:nvPr>
+            <p:ph type="sldNum" idx="12"/>
+          </p:nvPr>
+        </p:nvSpPr>
+        <p:spPr>
+          <a:xfrm>
+            <a:off x="3884613" y="8685213"/>
+            <a:ext cx="2971800" cy="458700"/>
+          </a:xfrm>
+          <a:prstGeom prst="rect">
+            <a:avLst/>
+          </a:prstGeom>
+          <a:noFill/>
+          <a:ln>
+            <a:noFill/>
+          </a:ln>
+        </p:spPr>
+        <p:txBody>
+          <a:bodyPr spcFirstLastPara="1" wrap="square" lIns="91425" tIns="45700" rIns="91425" bIns="45700" anchor="b" anchorCtr="0">
+            <a:noAutofit/>
+          </a:bodyPr>
+          <a:lstStyle/>
+          <a:p>
+            <a:pPr marL="0" marR="0" lvl="0" indent="0" algn="r" rtl="0">
+              <a:lnSpc>
+                <a:spcPct val="100000"/>
+              </a:lnSpc>
+              <a:spcBef>
+                <a:spcPts val="0"/>
+              </a:spcBef>
+              <a:spcAft>
+                <a:spcPts val="0"/>
+              </a:spcAft>
+              <a:buClr>
+                <a:srgbClr val="000000"/>
+              </a:buClr>
+              <a:buSzPts val="1400"/>
+              <a:buFont typeface="Arial"/>
+              <a:buNone/>
+            </a:pPr>
+            <a:fld id="{00000000-1234-1234-1234-123412341234}" type="slidenum">
+              <a:rPr lang="en" sz="1400" b="0" i="0" u="none" strike="noStrike" cap="none">
+                <a:solidFill>
+                  <a:srgbClr val="000000"/>
+                </a:solidFill>
+                <a:latin typeface="Arial"/>
+                <a:ea typeface="Arial"/>
+                <a:cs typeface="Arial"/>
+                <a:sym typeface="Arial"/>
+              </a:rPr>
+              <a:t>3</a:t>
+            </a:fld>
+            <a:endParaRPr sz="1400" b="0" i="0" u="none" strike="noStrike" cap="none">
+              <a:solidFill>
+                <a:srgbClr val="000000"/>
+              </a:solidFill>
+              <a:latin typeface="Arial"/>
+              <a:ea typeface="Arial"/>
+              <a:cs typeface="Arial"/>
+              <a:sym typeface="Arial"/>
+            </a:endParaRPr>
+          </a:p>
+        </p:txBody>
+      </p:sp>
+    </p:spTree>
+    <p:extLst>
+      <p:ext uri="{BB962C8B-B14F-4D97-AF65-F5344CB8AC3E}">
+        <p14:creationId xmlns:p14="http://schemas.microsoft.com/office/powerpoint/2010/main" val="2452779560"/>
       </p:ext>
     </p:extLst>
   </p:cSld>
@@ -12056,6 +12452,3363 @@
 </p:sld>
 </file>
 
+<file path=ppt/slides/slide2.xml><?xml version="1.0" encoding="utf-8"?>
+<p:sld xmlns:a="http://schemas.openxmlformats.org/drawingml/2006/main" xmlns:r="http://schemas.openxmlformats.org/officeDocument/2006/relationships" xmlns:p="http://schemas.openxmlformats.org/presentationml/2006/main">
+  <p:cSld>
+    <p:spTree>
+      <p:nvGrpSpPr>
+        <p:cNvPr id="1" name="Shape 70"/>
+        <p:cNvGrpSpPr/>
+        <p:nvPr/>
+      </p:nvGrpSpPr>
+      <p:grpSpPr>
+        <a:xfrm>
+          <a:off x="0" y="0"/>
+          <a:ext cx="0" cy="0"/>
+          <a:chOff x="0" y="0"/>
+          <a:chExt cx="0" cy="0"/>
+        </a:xfrm>
+      </p:grpSpPr>
+      <p:sp>
+        <p:nvSpPr>
+          <p:cNvPr id="71" name="Google Shape;71;p16"/>
+          <p:cNvSpPr txBox="1">
+            <a:spLocks noGrp="1"/>
+          </p:cNvSpPr>
+          <p:nvPr>
+            <p:ph type="title"/>
+          </p:nvPr>
+        </p:nvSpPr>
+        <p:spPr>
+          <a:xfrm>
+            <a:off x="453325" y="0"/>
+            <a:ext cx="8061900" cy="906900"/>
+          </a:xfrm>
+          <a:prstGeom prst="rect">
+            <a:avLst/>
+          </a:prstGeom>
+          <a:noFill/>
+          <a:ln>
+            <a:noFill/>
+          </a:ln>
+        </p:spPr>
+        <p:txBody>
+          <a:bodyPr spcFirstLastPara="1" wrap="square" lIns="68575" tIns="34275" rIns="68575" bIns="34275" anchor="b" anchorCtr="0">
+            <a:noAutofit/>
+          </a:bodyPr>
+          <a:lstStyle/>
+          <a:p>
+            <a:pPr marL="0" lvl="0" indent="0" algn="l" rtl="0">
+              <a:lnSpc>
+                <a:spcPct val="100000"/>
+              </a:lnSpc>
+              <a:spcBef>
+                <a:spcPts val="0"/>
+              </a:spcBef>
+              <a:spcAft>
+                <a:spcPts val="0"/>
+              </a:spcAft>
+              <a:buClr>
+                <a:schemeClr val="accent6"/>
+              </a:buClr>
+              <a:buSzPts val="2600"/>
+              <a:buFont typeface="Arial"/>
+              <a:buNone/>
+            </a:pPr>
+            <a:r>
+              <a:rPr lang="en" sz="2600" b="1" dirty="0">
+                <a:solidFill>
+                  <a:srgbClr val="980000"/>
+                </a:solidFill>
+                <a:latin typeface="Montserrat"/>
+                <a:ea typeface="Montserrat"/>
+                <a:cs typeface="Montserrat"/>
+                <a:sym typeface="Montserrat"/>
+              </a:rPr>
+              <a:t>Big Picture</a:t>
+            </a:r>
+            <a:endParaRPr b="1" dirty="0">
+              <a:solidFill>
+                <a:srgbClr val="980000"/>
+              </a:solidFill>
+              <a:latin typeface="Montserrat"/>
+              <a:ea typeface="Montserrat"/>
+              <a:cs typeface="Montserrat"/>
+              <a:sym typeface="Montserrat"/>
+            </a:endParaRPr>
+          </a:p>
+        </p:txBody>
+      </p:sp>
+      <p:pic>
+        <p:nvPicPr>
+          <p:cNvPr id="72" name="Google Shape;72;p16"/>
+          <p:cNvPicPr preferRelativeResize="0"/>
+          <p:nvPr/>
+        </p:nvPicPr>
+        <p:blipFill rotWithShape="1">
+          <a:blip r:embed="rId3">
+            <a:alphaModFix/>
+          </a:blip>
+          <a:srcRect/>
+          <a:stretch/>
+        </p:blipFill>
+        <p:spPr>
+          <a:xfrm>
+            <a:off x="8148919" y="70331"/>
+            <a:ext cx="906656" cy="906656"/>
+          </a:xfrm>
+          <a:prstGeom prst="rect">
+            <a:avLst/>
+          </a:prstGeom>
+          <a:noFill/>
+          <a:ln>
+            <a:noFill/>
+          </a:ln>
+        </p:spPr>
+      </p:pic>
+      <p:sp>
+        <p:nvSpPr>
+          <p:cNvPr id="73" name="Google Shape;73;p16"/>
+          <p:cNvSpPr txBox="1"/>
+          <p:nvPr/>
+        </p:nvSpPr>
+        <p:spPr>
+          <a:xfrm>
+            <a:off x="8100000" y="4766400"/>
+            <a:ext cx="432000" cy="273900"/>
+          </a:xfrm>
+          <a:prstGeom prst="rect">
+            <a:avLst/>
+          </a:prstGeom>
+          <a:noFill/>
+          <a:ln>
+            <a:noFill/>
+          </a:ln>
+        </p:spPr>
+        <p:txBody>
+          <a:bodyPr spcFirstLastPara="1" wrap="square" lIns="68575" tIns="34275" rIns="68575" bIns="34275" anchor="ctr" anchorCtr="0">
+            <a:noAutofit/>
+          </a:bodyPr>
+          <a:lstStyle/>
+          <a:p>
+            <a:pPr marL="0" marR="0" lvl="0" indent="0" algn="r" rtl="0">
+              <a:lnSpc>
+                <a:spcPct val="100000"/>
+              </a:lnSpc>
+              <a:spcBef>
+                <a:spcPts val="0"/>
+              </a:spcBef>
+              <a:spcAft>
+                <a:spcPts val="0"/>
+              </a:spcAft>
+              <a:buClr>
+                <a:srgbClr val="000000"/>
+              </a:buClr>
+              <a:buSzPts val="900"/>
+              <a:buFont typeface="Arial"/>
+              <a:buNone/>
+            </a:pPr>
+            <a:fld id="{00000000-1234-1234-1234-123412341234}" type="slidenum">
+              <a:rPr lang="en" sz="900" b="0" i="0" u="none" strike="noStrike" cap="none">
+                <a:solidFill>
+                  <a:srgbClr val="595959"/>
+                </a:solidFill>
+                <a:latin typeface="Arial"/>
+                <a:ea typeface="Arial"/>
+                <a:cs typeface="Arial"/>
+                <a:sym typeface="Arial"/>
+              </a:rPr>
+              <a:t>2</a:t>
+            </a:fld>
+            <a:endParaRPr sz="900" b="0" i="0" u="none" strike="noStrike" cap="none" dirty="0">
+              <a:solidFill>
+                <a:srgbClr val="595959"/>
+              </a:solidFill>
+              <a:latin typeface="Arial"/>
+              <a:ea typeface="Arial"/>
+              <a:cs typeface="Arial"/>
+              <a:sym typeface="Arial"/>
+            </a:endParaRPr>
+          </a:p>
+        </p:txBody>
+      </p:sp>
+      <p:sp>
+        <p:nvSpPr>
+          <p:cNvPr id="30" name="Espace réservé du contenu 3">
+            <a:extLst>
+              <a:ext uri="{FF2B5EF4-FFF2-40B4-BE49-F238E27FC236}">
+                <a16:creationId xmlns:a16="http://schemas.microsoft.com/office/drawing/2014/main" id="{381FF0B4-FFBA-9343-BBAE-044CEC63EA48}"/>
+              </a:ext>
+            </a:extLst>
+          </p:cNvPr>
+          <p:cNvSpPr txBox="1">
+            <a:spLocks/>
+          </p:cNvSpPr>
+          <p:nvPr/>
+        </p:nvSpPr>
+        <p:spPr>
+          <a:xfrm>
+            <a:off x="3386636" y="1372453"/>
+            <a:ext cx="1654326" cy="307777"/>
+          </a:xfrm>
+          <a:prstGeom prst="rect">
+            <a:avLst/>
+          </a:prstGeom>
+          <a:ln>
+            <a:solidFill>
+              <a:srgbClr val="70ADAB"/>
+            </a:solidFill>
+          </a:ln>
+        </p:spPr>
+        <p:txBody>
+          <a:bodyPr vert="horz" wrap="square" lIns="91440" tIns="45720" rIns="91440" bIns="45720" rtlCol="0">
+            <a:spAutoFit/>
+          </a:bodyPr>
+          <a:lstStyle>
+            <a:lvl1pPr marL="228600" indent="-228600" algn="l" defTabSz="914400" rtl="0" eaLnBrk="1" latinLnBrk="0" hangingPunct="1">
+              <a:lnSpc>
+                <a:spcPct val="90000"/>
+              </a:lnSpc>
+              <a:spcBef>
+                <a:spcPct val="30000"/>
+              </a:spcBef>
+              <a:buFont typeface="Arial" panose="020B0604020202020204" pitchFamily="34" charset="0"/>
+              <a:buChar char="•"/>
+              <a:defRPr sz="2800" kern="1200">
+                <a:solidFill>
+                  <a:schemeClr val="tx1"/>
+                </a:solidFill>
+                <a:latin typeface="+mn-lt"/>
+                <a:ea typeface="+mn-ea"/>
+                <a:cs typeface="+mn-cs"/>
+              </a:defRPr>
+            </a:lvl1pPr>
+            <a:lvl2pPr marL="685800" indent="-228600" algn="l" defTabSz="914400" rtl="0" eaLnBrk="1" latinLnBrk="0" hangingPunct="1">
+              <a:lnSpc>
+                <a:spcPct val="90000"/>
+              </a:lnSpc>
+              <a:spcBef>
+                <a:spcPct val="30000"/>
+              </a:spcBef>
+              <a:buFont typeface="Arial" panose="020B0604020202020204" pitchFamily="34" charset="0"/>
+              <a:buChar char="•"/>
+              <a:defRPr sz="2400" kern="1200">
+                <a:solidFill>
+                  <a:schemeClr val="tx1"/>
+                </a:solidFill>
+                <a:latin typeface="+mn-lt"/>
+                <a:ea typeface="+mn-ea"/>
+                <a:cs typeface="+mn-cs"/>
+              </a:defRPr>
+            </a:lvl2pPr>
+            <a:lvl3pPr marL="1143000" indent="-228600" algn="l" defTabSz="914400" rtl="0" eaLnBrk="1" latinLnBrk="0" hangingPunct="1">
+              <a:lnSpc>
+                <a:spcPct val="90000"/>
+              </a:lnSpc>
+              <a:spcBef>
+                <a:spcPct val="30000"/>
+              </a:spcBef>
+              <a:buFont typeface="Arial" panose="020B0604020202020204" pitchFamily="34" charset="0"/>
+              <a:buChar char="•"/>
+              <a:defRPr sz="2000" kern="1200">
+                <a:solidFill>
+                  <a:schemeClr val="tx1"/>
+                </a:solidFill>
+                <a:latin typeface="+mn-lt"/>
+                <a:ea typeface="+mn-ea"/>
+                <a:cs typeface="+mn-cs"/>
+              </a:defRPr>
+            </a:lvl3pPr>
+            <a:lvl4pPr marL="1600200" indent="-228600" algn="l" defTabSz="914400" rtl="0" eaLnBrk="1" latinLnBrk="0" hangingPunct="1">
+              <a:lnSpc>
+                <a:spcPct val="90000"/>
+              </a:lnSpc>
+              <a:spcBef>
+                <a:spcPct val="30000"/>
+              </a:spcBef>
+              <a:buFont typeface="Arial" panose="020B0604020202020204" pitchFamily="34" charset="0"/>
+              <a:buChar char="•"/>
+              <a:defRPr sz="1800" kern="1200">
+                <a:solidFill>
+                  <a:schemeClr val="tx1"/>
+                </a:solidFill>
+                <a:latin typeface="+mn-lt"/>
+                <a:ea typeface="+mn-ea"/>
+                <a:cs typeface="+mn-cs"/>
+              </a:defRPr>
+            </a:lvl4pPr>
+            <a:lvl5pPr marL="2057400" indent="-228600" algn="l" defTabSz="914400" rtl="0" eaLnBrk="1" latinLnBrk="0" hangingPunct="1">
+              <a:lnSpc>
+                <a:spcPct val="90000"/>
+              </a:lnSpc>
+              <a:spcBef>
+                <a:spcPct val="30000"/>
+              </a:spcBef>
+              <a:buFont typeface="Arial" panose="020B0604020202020204" pitchFamily="34" charset="0"/>
+              <a:buChar char="•"/>
+              <a:defRPr sz="1800" kern="1200">
+                <a:solidFill>
+                  <a:schemeClr val="tx1"/>
+                </a:solidFill>
+                <a:latin typeface="+mn-lt"/>
+                <a:ea typeface="+mn-ea"/>
+                <a:cs typeface="+mn-cs"/>
+              </a:defRPr>
+            </a:lvl5pPr>
+            <a:lvl6pPr marL="2514600" indent="-228600" algn="l" defTabSz="914400" rtl="0" eaLnBrk="1" latinLnBrk="0" hangingPunct="1">
+              <a:lnSpc>
+                <a:spcPct val="90000"/>
+              </a:lnSpc>
+              <a:spcBef>
+                <a:spcPct val="30000"/>
+              </a:spcBef>
+              <a:buFont typeface="Arial" panose="020B0604020202020204" pitchFamily="34" charset="0"/>
+              <a:buChar char="•"/>
+              <a:defRPr sz="1800" kern="1200">
+                <a:solidFill>
+                  <a:schemeClr val="tx1"/>
+                </a:solidFill>
+                <a:latin typeface="+mn-lt"/>
+                <a:ea typeface="+mn-ea"/>
+                <a:cs typeface="+mn-cs"/>
+              </a:defRPr>
+            </a:lvl6pPr>
+            <a:lvl7pPr marL="2971800" indent="-228600" algn="l" defTabSz="914400" rtl="0" eaLnBrk="1" latinLnBrk="0" hangingPunct="1">
+              <a:lnSpc>
+                <a:spcPct val="90000"/>
+              </a:lnSpc>
+              <a:spcBef>
+                <a:spcPct val="30000"/>
+              </a:spcBef>
+              <a:buFont typeface="Arial" panose="020B0604020202020204" pitchFamily="34" charset="0"/>
+              <a:buChar char="•"/>
+              <a:defRPr sz="1800" kern="1200">
+                <a:solidFill>
+                  <a:schemeClr val="tx1"/>
+                </a:solidFill>
+                <a:latin typeface="+mn-lt"/>
+                <a:ea typeface="+mn-ea"/>
+                <a:cs typeface="+mn-cs"/>
+              </a:defRPr>
+            </a:lvl7pPr>
+            <a:lvl8pPr marL="3429000" indent="-228600" algn="l" defTabSz="914400" rtl="0" eaLnBrk="1" latinLnBrk="0" hangingPunct="1">
+              <a:lnSpc>
+                <a:spcPct val="90000"/>
+              </a:lnSpc>
+              <a:spcBef>
+                <a:spcPct val="30000"/>
+              </a:spcBef>
+              <a:buFont typeface="Arial" panose="020B0604020202020204" pitchFamily="34" charset="0"/>
+              <a:buChar char="•"/>
+              <a:defRPr sz="1800" kern="1200">
+                <a:solidFill>
+                  <a:schemeClr val="tx1"/>
+                </a:solidFill>
+                <a:latin typeface="+mn-lt"/>
+                <a:ea typeface="+mn-ea"/>
+                <a:cs typeface="+mn-cs"/>
+              </a:defRPr>
+            </a:lvl8pPr>
+            <a:lvl9pPr marL="3886200" indent="-228600" algn="l" defTabSz="914400" rtl="0" eaLnBrk="1" latinLnBrk="0" hangingPunct="1">
+              <a:lnSpc>
+                <a:spcPct val="90000"/>
+              </a:lnSpc>
+              <a:spcBef>
+                <a:spcPct val="30000"/>
+              </a:spcBef>
+              <a:buFont typeface="Arial" panose="020B0604020202020204" pitchFamily="34" charset="0"/>
+              <a:buChar char="•"/>
+              <a:defRPr sz="1800" kern="1200">
+                <a:solidFill>
+                  <a:schemeClr val="tx1"/>
+                </a:solidFill>
+                <a:latin typeface="+mn-lt"/>
+                <a:ea typeface="+mn-ea"/>
+                <a:cs typeface="+mn-cs"/>
+              </a:defRPr>
+            </a:lvl9pPr>
+          </a:lstStyle>
+          <a:p>
+            <a:pPr marL="0" indent="0" algn="ctr">
+              <a:lnSpc>
+                <a:spcPct val="100000"/>
+              </a:lnSpc>
+              <a:spcBef>
+                <a:spcPts val="300"/>
+              </a:spcBef>
+              <a:buNone/>
+            </a:pPr>
+            <a:r>
+              <a:rPr lang="en-GB" sz="1400" dirty="0">
+                <a:solidFill>
+                  <a:srgbClr val="0B5394"/>
+                </a:solidFill>
+                <a:latin typeface="Arial" panose="020B0604020202020204" pitchFamily="34" charset="0"/>
+                <a:cs typeface="Arial" panose="020B0604020202020204" pitchFamily="34" charset="0"/>
+              </a:rPr>
+              <a:t>Business Logic</a:t>
+            </a:r>
+          </a:p>
+        </p:txBody>
+      </p:sp>
+      <p:sp>
+        <p:nvSpPr>
+          <p:cNvPr id="32" name="Espace réservé du contenu 3">
+            <a:extLst>
+              <a:ext uri="{FF2B5EF4-FFF2-40B4-BE49-F238E27FC236}">
+                <a16:creationId xmlns:a16="http://schemas.microsoft.com/office/drawing/2014/main" id="{39A10FD4-142A-E746-A031-413578D7D5A2}"/>
+              </a:ext>
+            </a:extLst>
+          </p:cNvPr>
+          <p:cNvSpPr txBox="1">
+            <a:spLocks/>
+          </p:cNvSpPr>
+          <p:nvPr/>
+        </p:nvSpPr>
+        <p:spPr>
+          <a:xfrm>
+            <a:off x="933175" y="1372453"/>
+            <a:ext cx="1801906" cy="307777"/>
+          </a:xfrm>
+          <a:prstGeom prst="rect">
+            <a:avLst/>
+          </a:prstGeom>
+          <a:ln>
+            <a:solidFill>
+              <a:srgbClr val="70ADAB"/>
+            </a:solidFill>
+          </a:ln>
+        </p:spPr>
+        <p:txBody>
+          <a:bodyPr vert="horz" wrap="square" lIns="91440" tIns="45720" rIns="91440" bIns="45720" rtlCol="0">
+            <a:spAutoFit/>
+          </a:bodyPr>
+          <a:lstStyle>
+            <a:lvl1pPr marL="228600" indent="-228600" algn="l" defTabSz="914400" rtl="0" eaLnBrk="1" latinLnBrk="0" hangingPunct="1">
+              <a:lnSpc>
+                <a:spcPct val="90000"/>
+              </a:lnSpc>
+              <a:spcBef>
+                <a:spcPct val="30000"/>
+              </a:spcBef>
+              <a:buFont typeface="Arial" panose="020B0604020202020204" pitchFamily="34" charset="0"/>
+              <a:buChar char="•"/>
+              <a:defRPr sz="2800" kern="1200">
+                <a:solidFill>
+                  <a:schemeClr val="tx1"/>
+                </a:solidFill>
+                <a:latin typeface="+mn-lt"/>
+                <a:ea typeface="+mn-ea"/>
+                <a:cs typeface="+mn-cs"/>
+              </a:defRPr>
+            </a:lvl1pPr>
+            <a:lvl2pPr marL="685800" indent="-228600" algn="l" defTabSz="914400" rtl="0" eaLnBrk="1" latinLnBrk="0" hangingPunct="1">
+              <a:lnSpc>
+                <a:spcPct val="90000"/>
+              </a:lnSpc>
+              <a:spcBef>
+                <a:spcPct val="30000"/>
+              </a:spcBef>
+              <a:buFont typeface="Arial" panose="020B0604020202020204" pitchFamily="34" charset="0"/>
+              <a:buChar char="•"/>
+              <a:defRPr sz="2400" kern="1200">
+                <a:solidFill>
+                  <a:schemeClr val="tx1"/>
+                </a:solidFill>
+                <a:latin typeface="+mn-lt"/>
+                <a:ea typeface="+mn-ea"/>
+                <a:cs typeface="+mn-cs"/>
+              </a:defRPr>
+            </a:lvl2pPr>
+            <a:lvl3pPr marL="1143000" indent="-228600" algn="l" defTabSz="914400" rtl="0" eaLnBrk="1" latinLnBrk="0" hangingPunct="1">
+              <a:lnSpc>
+                <a:spcPct val="90000"/>
+              </a:lnSpc>
+              <a:spcBef>
+                <a:spcPct val="30000"/>
+              </a:spcBef>
+              <a:buFont typeface="Arial" panose="020B0604020202020204" pitchFamily="34" charset="0"/>
+              <a:buChar char="•"/>
+              <a:defRPr sz="2000" kern="1200">
+                <a:solidFill>
+                  <a:schemeClr val="tx1"/>
+                </a:solidFill>
+                <a:latin typeface="+mn-lt"/>
+                <a:ea typeface="+mn-ea"/>
+                <a:cs typeface="+mn-cs"/>
+              </a:defRPr>
+            </a:lvl3pPr>
+            <a:lvl4pPr marL="1600200" indent="-228600" algn="l" defTabSz="914400" rtl="0" eaLnBrk="1" latinLnBrk="0" hangingPunct="1">
+              <a:lnSpc>
+                <a:spcPct val="90000"/>
+              </a:lnSpc>
+              <a:spcBef>
+                <a:spcPct val="30000"/>
+              </a:spcBef>
+              <a:buFont typeface="Arial" panose="020B0604020202020204" pitchFamily="34" charset="0"/>
+              <a:buChar char="•"/>
+              <a:defRPr sz="1800" kern="1200">
+                <a:solidFill>
+                  <a:schemeClr val="tx1"/>
+                </a:solidFill>
+                <a:latin typeface="+mn-lt"/>
+                <a:ea typeface="+mn-ea"/>
+                <a:cs typeface="+mn-cs"/>
+              </a:defRPr>
+            </a:lvl4pPr>
+            <a:lvl5pPr marL="2057400" indent="-228600" algn="l" defTabSz="914400" rtl="0" eaLnBrk="1" latinLnBrk="0" hangingPunct="1">
+              <a:lnSpc>
+                <a:spcPct val="90000"/>
+              </a:lnSpc>
+              <a:spcBef>
+                <a:spcPct val="30000"/>
+              </a:spcBef>
+              <a:buFont typeface="Arial" panose="020B0604020202020204" pitchFamily="34" charset="0"/>
+              <a:buChar char="•"/>
+              <a:defRPr sz="1800" kern="1200">
+                <a:solidFill>
+                  <a:schemeClr val="tx1"/>
+                </a:solidFill>
+                <a:latin typeface="+mn-lt"/>
+                <a:ea typeface="+mn-ea"/>
+                <a:cs typeface="+mn-cs"/>
+              </a:defRPr>
+            </a:lvl5pPr>
+            <a:lvl6pPr marL="2514600" indent="-228600" algn="l" defTabSz="914400" rtl="0" eaLnBrk="1" latinLnBrk="0" hangingPunct="1">
+              <a:lnSpc>
+                <a:spcPct val="90000"/>
+              </a:lnSpc>
+              <a:spcBef>
+                <a:spcPct val="30000"/>
+              </a:spcBef>
+              <a:buFont typeface="Arial" panose="020B0604020202020204" pitchFamily="34" charset="0"/>
+              <a:buChar char="•"/>
+              <a:defRPr sz="1800" kern="1200">
+                <a:solidFill>
+                  <a:schemeClr val="tx1"/>
+                </a:solidFill>
+                <a:latin typeface="+mn-lt"/>
+                <a:ea typeface="+mn-ea"/>
+                <a:cs typeface="+mn-cs"/>
+              </a:defRPr>
+            </a:lvl6pPr>
+            <a:lvl7pPr marL="2971800" indent="-228600" algn="l" defTabSz="914400" rtl="0" eaLnBrk="1" latinLnBrk="0" hangingPunct="1">
+              <a:lnSpc>
+                <a:spcPct val="90000"/>
+              </a:lnSpc>
+              <a:spcBef>
+                <a:spcPct val="30000"/>
+              </a:spcBef>
+              <a:buFont typeface="Arial" panose="020B0604020202020204" pitchFamily="34" charset="0"/>
+              <a:buChar char="•"/>
+              <a:defRPr sz="1800" kern="1200">
+                <a:solidFill>
+                  <a:schemeClr val="tx1"/>
+                </a:solidFill>
+                <a:latin typeface="+mn-lt"/>
+                <a:ea typeface="+mn-ea"/>
+                <a:cs typeface="+mn-cs"/>
+              </a:defRPr>
+            </a:lvl7pPr>
+            <a:lvl8pPr marL="3429000" indent="-228600" algn="l" defTabSz="914400" rtl="0" eaLnBrk="1" latinLnBrk="0" hangingPunct="1">
+              <a:lnSpc>
+                <a:spcPct val="90000"/>
+              </a:lnSpc>
+              <a:spcBef>
+                <a:spcPct val="30000"/>
+              </a:spcBef>
+              <a:buFont typeface="Arial" panose="020B0604020202020204" pitchFamily="34" charset="0"/>
+              <a:buChar char="•"/>
+              <a:defRPr sz="1800" kern="1200">
+                <a:solidFill>
+                  <a:schemeClr val="tx1"/>
+                </a:solidFill>
+                <a:latin typeface="+mn-lt"/>
+                <a:ea typeface="+mn-ea"/>
+                <a:cs typeface="+mn-cs"/>
+              </a:defRPr>
+            </a:lvl8pPr>
+            <a:lvl9pPr marL="3886200" indent="-228600" algn="l" defTabSz="914400" rtl="0" eaLnBrk="1" latinLnBrk="0" hangingPunct="1">
+              <a:lnSpc>
+                <a:spcPct val="90000"/>
+              </a:lnSpc>
+              <a:spcBef>
+                <a:spcPct val="30000"/>
+              </a:spcBef>
+              <a:buFont typeface="Arial" panose="020B0604020202020204" pitchFamily="34" charset="0"/>
+              <a:buChar char="•"/>
+              <a:defRPr sz="1800" kern="1200">
+                <a:solidFill>
+                  <a:schemeClr val="tx1"/>
+                </a:solidFill>
+                <a:latin typeface="+mn-lt"/>
+                <a:ea typeface="+mn-ea"/>
+                <a:cs typeface="+mn-cs"/>
+              </a:defRPr>
+            </a:lvl9pPr>
+          </a:lstStyle>
+          <a:p>
+            <a:pPr marL="0" indent="0" algn="ctr">
+              <a:lnSpc>
+                <a:spcPct val="100000"/>
+              </a:lnSpc>
+              <a:spcBef>
+                <a:spcPts val="300"/>
+              </a:spcBef>
+              <a:buNone/>
+            </a:pPr>
+            <a:r>
+              <a:rPr lang="en-GB" sz="1400" dirty="0">
+                <a:solidFill>
+                  <a:srgbClr val="0B5394"/>
+                </a:solidFill>
+                <a:latin typeface="Arial" panose="020B0604020202020204" pitchFamily="34" charset="0"/>
+                <a:cs typeface="Arial" panose="020B0604020202020204" pitchFamily="34" charset="0"/>
+              </a:rPr>
+              <a:t>GUI: user interface</a:t>
+            </a:r>
+          </a:p>
+        </p:txBody>
+      </p:sp>
+      <p:pic>
+        <p:nvPicPr>
+          <p:cNvPr id="17" name="Picture 16">
+            <a:extLst>
+              <a:ext uri="{FF2B5EF4-FFF2-40B4-BE49-F238E27FC236}">
+                <a16:creationId xmlns:a16="http://schemas.microsoft.com/office/drawing/2014/main" id="{4DA5F4D3-F8D9-0C95-CF94-F91880F737F7}"/>
+              </a:ext>
+            </a:extLst>
+          </p:cNvPr>
+          <p:cNvPicPr>
+            <a:picLocks noChangeAspect="1"/>
+          </p:cNvPicPr>
+          <p:nvPr/>
+        </p:nvPicPr>
+        <p:blipFill>
+          <a:blip r:embed="rId4"/>
+          <a:stretch>
+            <a:fillRect/>
+          </a:stretch>
+        </p:blipFill>
+        <p:spPr>
+          <a:xfrm>
+            <a:off x="46705" y="1099019"/>
+            <a:ext cx="775905" cy="828393"/>
+          </a:xfrm>
+          <a:prstGeom prst="rect">
+            <a:avLst/>
+          </a:prstGeom>
+        </p:spPr>
+      </p:pic>
+      <p:cxnSp>
+        <p:nvCxnSpPr>
+          <p:cNvPr id="3" name="Elbow Connector 2">
+            <a:extLst>
+              <a:ext uri="{FF2B5EF4-FFF2-40B4-BE49-F238E27FC236}">
+                <a16:creationId xmlns:a16="http://schemas.microsoft.com/office/drawing/2014/main" id="{1C27C4BC-7242-DCBA-C49A-55313A46B28F}"/>
+              </a:ext>
+            </a:extLst>
+          </p:cNvPr>
+          <p:cNvCxnSpPr>
+            <a:stCxn id="32" idx="3"/>
+            <a:endCxn id="30" idx="1"/>
+          </p:cNvCxnSpPr>
+          <p:nvPr/>
+        </p:nvCxnSpPr>
+        <p:spPr>
+          <a:xfrm>
+            <a:off x="2735081" y="1526342"/>
+            <a:ext cx="651555" cy="12700"/>
+          </a:xfrm>
+          <a:prstGeom prst="bentConnector3">
+            <a:avLst/>
+          </a:prstGeom>
+          <a:ln>
+            <a:headEnd type="triangle"/>
+            <a:tailEnd type="triangle"/>
+          </a:ln>
+        </p:spPr>
+        <p:style>
+          <a:lnRef idx="1">
+            <a:schemeClr val="accent1"/>
+          </a:lnRef>
+          <a:fillRef idx="0">
+            <a:schemeClr val="accent1"/>
+          </a:fillRef>
+          <a:effectRef idx="0">
+            <a:schemeClr val="accent1"/>
+          </a:effectRef>
+          <a:fontRef idx="minor">
+            <a:schemeClr val="tx1"/>
+          </a:fontRef>
+        </p:style>
+      </p:cxnSp>
+      <p:sp>
+        <p:nvSpPr>
+          <p:cNvPr id="34" name="TextBox 33">
+            <a:extLst>
+              <a:ext uri="{FF2B5EF4-FFF2-40B4-BE49-F238E27FC236}">
+                <a16:creationId xmlns:a16="http://schemas.microsoft.com/office/drawing/2014/main" id="{97139C91-AE21-A422-9B03-FA8EF73C7B54}"/>
+              </a:ext>
+            </a:extLst>
+          </p:cNvPr>
+          <p:cNvSpPr txBox="1"/>
+          <p:nvPr/>
+        </p:nvSpPr>
+        <p:spPr>
+          <a:xfrm>
+            <a:off x="933176" y="1773523"/>
+            <a:ext cx="1801906" cy="261610"/>
+          </a:xfrm>
+          <a:prstGeom prst="rect">
+            <a:avLst/>
+          </a:prstGeom>
+          <a:noFill/>
+        </p:spPr>
+        <p:txBody>
+          <a:bodyPr wrap="square">
+            <a:spAutoFit/>
+          </a:bodyPr>
+          <a:lstStyle/>
+          <a:p>
+            <a:pPr algn="ctr"/>
+            <a:r>
+              <a:rPr lang="en-LU" sz="1050" dirty="0"/>
+              <a:t>JavaScript compiler</a:t>
+            </a:r>
+          </a:p>
+        </p:txBody>
+      </p:sp>
+      <p:sp>
+        <p:nvSpPr>
+          <p:cNvPr id="45" name="TextBox 44">
+            <a:extLst>
+              <a:ext uri="{FF2B5EF4-FFF2-40B4-BE49-F238E27FC236}">
+                <a16:creationId xmlns:a16="http://schemas.microsoft.com/office/drawing/2014/main" id="{809B6285-23DD-14EA-E800-673094CC7E0E}"/>
+              </a:ext>
+            </a:extLst>
+          </p:cNvPr>
+          <p:cNvSpPr txBox="1"/>
+          <p:nvPr/>
+        </p:nvSpPr>
+        <p:spPr>
+          <a:xfrm>
+            <a:off x="3386636" y="1773522"/>
+            <a:ext cx="1654325" cy="253916"/>
+          </a:xfrm>
+          <a:prstGeom prst="rect">
+            <a:avLst/>
+          </a:prstGeom>
+          <a:noFill/>
+        </p:spPr>
+        <p:txBody>
+          <a:bodyPr wrap="square">
+            <a:spAutoFit/>
+          </a:bodyPr>
+          <a:lstStyle/>
+          <a:p>
+            <a:pPr algn="ctr"/>
+            <a:r>
+              <a:rPr lang="en-LU" sz="1050" dirty="0"/>
+              <a:t>Solidity compiler</a:t>
+            </a:r>
+          </a:p>
+        </p:txBody>
+      </p:sp>
+      <p:cxnSp>
+        <p:nvCxnSpPr>
+          <p:cNvPr id="42" name="Straight Arrow Connector 41">
+            <a:extLst>
+              <a:ext uri="{FF2B5EF4-FFF2-40B4-BE49-F238E27FC236}">
+                <a16:creationId xmlns:a16="http://schemas.microsoft.com/office/drawing/2014/main" id="{BECC52E3-BFA1-BB66-1EFA-A5FC9D25EB79}"/>
+              </a:ext>
+            </a:extLst>
+          </p:cNvPr>
+          <p:cNvCxnSpPr>
+            <a:cxnSpLocks/>
+          </p:cNvCxnSpPr>
+          <p:nvPr/>
+        </p:nvCxnSpPr>
+        <p:spPr>
+          <a:xfrm>
+            <a:off x="933175" y="2330824"/>
+            <a:ext cx="4107786" cy="0"/>
+          </a:xfrm>
+          <a:prstGeom prst="straightConnector1">
+            <a:avLst/>
+          </a:prstGeom>
+          <a:ln>
+            <a:headEnd type="triangle"/>
+            <a:tailEnd type="triangle"/>
+          </a:ln>
+        </p:spPr>
+        <p:style>
+          <a:lnRef idx="1">
+            <a:schemeClr val="accent1"/>
+          </a:lnRef>
+          <a:fillRef idx="0">
+            <a:schemeClr val="accent1"/>
+          </a:fillRef>
+          <a:effectRef idx="0">
+            <a:schemeClr val="accent1"/>
+          </a:effectRef>
+          <a:fontRef idx="minor">
+            <a:schemeClr val="tx1"/>
+          </a:fontRef>
+        </p:style>
+      </p:cxnSp>
+      <p:sp>
+        <p:nvSpPr>
+          <p:cNvPr id="51" name="TextBox 50">
+            <a:extLst>
+              <a:ext uri="{FF2B5EF4-FFF2-40B4-BE49-F238E27FC236}">
+                <a16:creationId xmlns:a16="http://schemas.microsoft.com/office/drawing/2014/main" id="{BF1737E1-0685-2AF4-71E8-F6B35213B7F4}"/>
+              </a:ext>
+            </a:extLst>
+          </p:cNvPr>
+          <p:cNvSpPr txBox="1"/>
+          <p:nvPr/>
+        </p:nvSpPr>
+        <p:spPr>
+          <a:xfrm>
+            <a:off x="2159905" y="2372745"/>
+            <a:ext cx="1801906" cy="261610"/>
+          </a:xfrm>
+          <a:prstGeom prst="rect">
+            <a:avLst/>
+          </a:prstGeom>
+          <a:noFill/>
+        </p:spPr>
+        <p:txBody>
+          <a:bodyPr wrap="square">
+            <a:spAutoFit/>
+          </a:bodyPr>
+          <a:lstStyle/>
+          <a:p>
+            <a:pPr algn="ctr"/>
+            <a:r>
+              <a:rPr lang="en-LU" sz="1050" dirty="0"/>
+              <a:t>Remix IDE</a:t>
+            </a:r>
+          </a:p>
+        </p:txBody>
+      </p:sp>
+    </p:spTree>
+    <p:extLst>
+      <p:ext uri="{BB962C8B-B14F-4D97-AF65-F5344CB8AC3E}">
+        <p14:creationId xmlns:p14="http://schemas.microsoft.com/office/powerpoint/2010/main" val="4216721009"/>
+      </p:ext>
+    </p:extLst>
+  </p:cSld>
+  <p:clrMapOvr>
+    <a:masterClrMapping/>
+  </p:clrMapOvr>
+</p:sld>
+</file>
+
+<file path=ppt/slides/slide3.xml><?xml version="1.0" encoding="utf-8"?>
+<p:sld xmlns:a="http://schemas.openxmlformats.org/drawingml/2006/main" xmlns:r="http://schemas.openxmlformats.org/officeDocument/2006/relationships" xmlns:p="http://schemas.openxmlformats.org/presentationml/2006/main">
+  <p:cSld>
+    <p:spTree>
+      <p:nvGrpSpPr>
+        <p:cNvPr id="1" name="Shape 70"/>
+        <p:cNvGrpSpPr/>
+        <p:nvPr/>
+      </p:nvGrpSpPr>
+      <p:grpSpPr>
+        <a:xfrm>
+          <a:off x="0" y="0"/>
+          <a:ext cx="0" cy="0"/>
+          <a:chOff x="0" y="0"/>
+          <a:chExt cx="0" cy="0"/>
+        </a:xfrm>
+      </p:grpSpPr>
+      <p:sp>
+        <p:nvSpPr>
+          <p:cNvPr id="71" name="Google Shape;71;p16"/>
+          <p:cNvSpPr txBox="1">
+            <a:spLocks noGrp="1"/>
+          </p:cNvSpPr>
+          <p:nvPr>
+            <p:ph type="title"/>
+          </p:nvPr>
+        </p:nvSpPr>
+        <p:spPr>
+          <a:xfrm>
+            <a:off x="453325" y="0"/>
+            <a:ext cx="8061900" cy="906900"/>
+          </a:xfrm>
+          <a:prstGeom prst="rect">
+            <a:avLst/>
+          </a:prstGeom>
+          <a:noFill/>
+          <a:ln>
+            <a:noFill/>
+          </a:ln>
+        </p:spPr>
+        <p:txBody>
+          <a:bodyPr spcFirstLastPara="1" wrap="square" lIns="68575" tIns="34275" rIns="68575" bIns="34275" anchor="b" anchorCtr="0">
+            <a:noAutofit/>
+          </a:bodyPr>
+          <a:lstStyle/>
+          <a:p>
+            <a:pPr marL="0" lvl="0" indent="0" algn="l" rtl="0">
+              <a:lnSpc>
+                <a:spcPct val="100000"/>
+              </a:lnSpc>
+              <a:spcBef>
+                <a:spcPts val="0"/>
+              </a:spcBef>
+              <a:spcAft>
+                <a:spcPts val="0"/>
+              </a:spcAft>
+              <a:buClr>
+                <a:schemeClr val="accent6"/>
+              </a:buClr>
+              <a:buSzPts val="2600"/>
+              <a:buFont typeface="Arial"/>
+              <a:buNone/>
+            </a:pPr>
+            <a:r>
+              <a:rPr lang="en" sz="2600" b="1" dirty="0">
+                <a:solidFill>
+                  <a:srgbClr val="980000"/>
+                </a:solidFill>
+                <a:latin typeface="Montserrat"/>
+                <a:ea typeface="Montserrat"/>
+                <a:cs typeface="Montserrat"/>
+                <a:sym typeface="Montserrat"/>
+              </a:rPr>
+              <a:t>Big Picture</a:t>
+            </a:r>
+            <a:endParaRPr b="1" dirty="0">
+              <a:solidFill>
+                <a:srgbClr val="980000"/>
+              </a:solidFill>
+              <a:latin typeface="Montserrat"/>
+              <a:ea typeface="Montserrat"/>
+              <a:cs typeface="Montserrat"/>
+              <a:sym typeface="Montserrat"/>
+            </a:endParaRPr>
+          </a:p>
+        </p:txBody>
+      </p:sp>
+      <p:pic>
+        <p:nvPicPr>
+          <p:cNvPr id="72" name="Google Shape;72;p16"/>
+          <p:cNvPicPr preferRelativeResize="0"/>
+          <p:nvPr/>
+        </p:nvPicPr>
+        <p:blipFill rotWithShape="1">
+          <a:blip r:embed="rId3">
+            <a:alphaModFix/>
+          </a:blip>
+          <a:srcRect/>
+          <a:stretch/>
+        </p:blipFill>
+        <p:spPr>
+          <a:xfrm>
+            <a:off x="8148919" y="70331"/>
+            <a:ext cx="906656" cy="906656"/>
+          </a:xfrm>
+          <a:prstGeom prst="rect">
+            <a:avLst/>
+          </a:prstGeom>
+          <a:noFill/>
+          <a:ln>
+            <a:noFill/>
+          </a:ln>
+        </p:spPr>
+      </p:pic>
+      <p:sp>
+        <p:nvSpPr>
+          <p:cNvPr id="73" name="Google Shape;73;p16"/>
+          <p:cNvSpPr txBox="1"/>
+          <p:nvPr/>
+        </p:nvSpPr>
+        <p:spPr>
+          <a:xfrm>
+            <a:off x="8100000" y="4766400"/>
+            <a:ext cx="432000" cy="273900"/>
+          </a:xfrm>
+          <a:prstGeom prst="rect">
+            <a:avLst/>
+          </a:prstGeom>
+          <a:noFill/>
+          <a:ln>
+            <a:noFill/>
+          </a:ln>
+        </p:spPr>
+        <p:txBody>
+          <a:bodyPr spcFirstLastPara="1" wrap="square" lIns="68575" tIns="34275" rIns="68575" bIns="34275" anchor="ctr" anchorCtr="0">
+            <a:noAutofit/>
+          </a:bodyPr>
+          <a:lstStyle/>
+          <a:p>
+            <a:pPr marL="0" marR="0" lvl="0" indent="0" algn="r" rtl="0">
+              <a:lnSpc>
+                <a:spcPct val="100000"/>
+              </a:lnSpc>
+              <a:spcBef>
+                <a:spcPts val="0"/>
+              </a:spcBef>
+              <a:spcAft>
+                <a:spcPts val="0"/>
+              </a:spcAft>
+              <a:buClr>
+                <a:srgbClr val="000000"/>
+              </a:buClr>
+              <a:buSzPts val="900"/>
+              <a:buFont typeface="Arial"/>
+              <a:buNone/>
+            </a:pPr>
+            <a:fld id="{00000000-1234-1234-1234-123412341234}" type="slidenum">
+              <a:rPr lang="en" sz="900" b="0" i="0" u="none" strike="noStrike" cap="none">
+                <a:solidFill>
+                  <a:srgbClr val="595959"/>
+                </a:solidFill>
+                <a:latin typeface="Arial"/>
+                <a:ea typeface="Arial"/>
+                <a:cs typeface="Arial"/>
+                <a:sym typeface="Arial"/>
+              </a:rPr>
+              <a:t>3</a:t>
+            </a:fld>
+            <a:endParaRPr sz="900" b="0" i="0" u="none" strike="noStrike" cap="none" dirty="0">
+              <a:solidFill>
+                <a:srgbClr val="595959"/>
+              </a:solidFill>
+              <a:latin typeface="Arial"/>
+              <a:ea typeface="Arial"/>
+              <a:cs typeface="Arial"/>
+              <a:sym typeface="Arial"/>
+            </a:endParaRPr>
+          </a:p>
+        </p:txBody>
+      </p:sp>
+      <p:sp>
+        <p:nvSpPr>
+          <p:cNvPr id="19" name="Espace réservé du contenu 3">
+            <a:extLst>
+              <a:ext uri="{FF2B5EF4-FFF2-40B4-BE49-F238E27FC236}">
+                <a16:creationId xmlns:a16="http://schemas.microsoft.com/office/drawing/2014/main" id="{22977A32-DA03-99BA-DCEA-7B453766FF1D}"/>
+              </a:ext>
+            </a:extLst>
+          </p:cNvPr>
+          <p:cNvSpPr txBox="1">
+            <a:spLocks/>
+          </p:cNvSpPr>
+          <p:nvPr/>
+        </p:nvSpPr>
+        <p:spPr>
+          <a:xfrm>
+            <a:off x="368398" y="1801242"/>
+            <a:ext cx="1801906" cy="276999"/>
+          </a:xfrm>
+          <a:prstGeom prst="rect">
+            <a:avLst/>
+          </a:prstGeom>
+          <a:ln>
+            <a:solidFill>
+              <a:srgbClr val="70ADAB"/>
+            </a:solidFill>
+          </a:ln>
+        </p:spPr>
+        <p:txBody>
+          <a:bodyPr vert="horz" wrap="square" lIns="91440" tIns="45720" rIns="91440" bIns="45720" rtlCol="0">
+            <a:spAutoFit/>
+          </a:bodyPr>
+          <a:lstStyle>
+            <a:lvl1pPr marL="228600" indent="-228600" algn="l" defTabSz="914400" rtl="0" eaLnBrk="1" latinLnBrk="0" hangingPunct="1">
+              <a:lnSpc>
+                <a:spcPct val="90000"/>
+              </a:lnSpc>
+              <a:spcBef>
+                <a:spcPct val="30000"/>
+              </a:spcBef>
+              <a:buFont typeface="Arial" panose="020B0604020202020204" pitchFamily="34" charset="0"/>
+              <a:buChar char="•"/>
+              <a:defRPr sz="2800" kern="1200">
+                <a:solidFill>
+                  <a:schemeClr val="tx1"/>
+                </a:solidFill>
+                <a:latin typeface="+mn-lt"/>
+                <a:ea typeface="+mn-ea"/>
+                <a:cs typeface="+mn-cs"/>
+              </a:defRPr>
+            </a:lvl1pPr>
+            <a:lvl2pPr marL="685800" indent="-228600" algn="l" defTabSz="914400" rtl="0" eaLnBrk="1" latinLnBrk="0" hangingPunct="1">
+              <a:lnSpc>
+                <a:spcPct val="90000"/>
+              </a:lnSpc>
+              <a:spcBef>
+                <a:spcPct val="30000"/>
+              </a:spcBef>
+              <a:buFont typeface="Arial" panose="020B0604020202020204" pitchFamily="34" charset="0"/>
+              <a:buChar char="•"/>
+              <a:defRPr sz="2400" kern="1200">
+                <a:solidFill>
+                  <a:schemeClr val="tx1"/>
+                </a:solidFill>
+                <a:latin typeface="+mn-lt"/>
+                <a:ea typeface="+mn-ea"/>
+                <a:cs typeface="+mn-cs"/>
+              </a:defRPr>
+            </a:lvl2pPr>
+            <a:lvl3pPr marL="1143000" indent="-228600" algn="l" defTabSz="914400" rtl="0" eaLnBrk="1" latinLnBrk="0" hangingPunct="1">
+              <a:lnSpc>
+                <a:spcPct val="90000"/>
+              </a:lnSpc>
+              <a:spcBef>
+                <a:spcPct val="30000"/>
+              </a:spcBef>
+              <a:buFont typeface="Arial" panose="020B0604020202020204" pitchFamily="34" charset="0"/>
+              <a:buChar char="•"/>
+              <a:defRPr sz="2000" kern="1200">
+                <a:solidFill>
+                  <a:schemeClr val="tx1"/>
+                </a:solidFill>
+                <a:latin typeface="+mn-lt"/>
+                <a:ea typeface="+mn-ea"/>
+                <a:cs typeface="+mn-cs"/>
+              </a:defRPr>
+            </a:lvl3pPr>
+            <a:lvl4pPr marL="1600200" indent="-228600" algn="l" defTabSz="914400" rtl="0" eaLnBrk="1" latinLnBrk="0" hangingPunct="1">
+              <a:lnSpc>
+                <a:spcPct val="90000"/>
+              </a:lnSpc>
+              <a:spcBef>
+                <a:spcPct val="30000"/>
+              </a:spcBef>
+              <a:buFont typeface="Arial" panose="020B0604020202020204" pitchFamily="34" charset="0"/>
+              <a:buChar char="•"/>
+              <a:defRPr sz="1800" kern="1200">
+                <a:solidFill>
+                  <a:schemeClr val="tx1"/>
+                </a:solidFill>
+                <a:latin typeface="+mn-lt"/>
+                <a:ea typeface="+mn-ea"/>
+                <a:cs typeface="+mn-cs"/>
+              </a:defRPr>
+            </a:lvl4pPr>
+            <a:lvl5pPr marL="2057400" indent="-228600" algn="l" defTabSz="914400" rtl="0" eaLnBrk="1" latinLnBrk="0" hangingPunct="1">
+              <a:lnSpc>
+                <a:spcPct val="90000"/>
+              </a:lnSpc>
+              <a:spcBef>
+                <a:spcPct val="30000"/>
+              </a:spcBef>
+              <a:buFont typeface="Arial" panose="020B0604020202020204" pitchFamily="34" charset="0"/>
+              <a:buChar char="•"/>
+              <a:defRPr sz="1800" kern="1200">
+                <a:solidFill>
+                  <a:schemeClr val="tx1"/>
+                </a:solidFill>
+                <a:latin typeface="+mn-lt"/>
+                <a:ea typeface="+mn-ea"/>
+                <a:cs typeface="+mn-cs"/>
+              </a:defRPr>
+            </a:lvl5pPr>
+            <a:lvl6pPr marL="2514600" indent="-228600" algn="l" defTabSz="914400" rtl="0" eaLnBrk="1" latinLnBrk="0" hangingPunct="1">
+              <a:lnSpc>
+                <a:spcPct val="90000"/>
+              </a:lnSpc>
+              <a:spcBef>
+                <a:spcPct val="30000"/>
+              </a:spcBef>
+              <a:buFont typeface="Arial" panose="020B0604020202020204" pitchFamily="34" charset="0"/>
+              <a:buChar char="•"/>
+              <a:defRPr sz="1800" kern="1200">
+                <a:solidFill>
+                  <a:schemeClr val="tx1"/>
+                </a:solidFill>
+                <a:latin typeface="+mn-lt"/>
+                <a:ea typeface="+mn-ea"/>
+                <a:cs typeface="+mn-cs"/>
+              </a:defRPr>
+            </a:lvl6pPr>
+            <a:lvl7pPr marL="2971800" indent="-228600" algn="l" defTabSz="914400" rtl="0" eaLnBrk="1" latinLnBrk="0" hangingPunct="1">
+              <a:lnSpc>
+                <a:spcPct val="90000"/>
+              </a:lnSpc>
+              <a:spcBef>
+                <a:spcPct val="30000"/>
+              </a:spcBef>
+              <a:buFont typeface="Arial" panose="020B0604020202020204" pitchFamily="34" charset="0"/>
+              <a:buChar char="•"/>
+              <a:defRPr sz="1800" kern="1200">
+                <a:solidFill>
+                  <a:schemeClr val="tx1"/>
+                </a:solidFill>
+                <a:latin typeface="+mn-lt"/>
+                <a:ea typeface="+mn-ea"/>
+                <a:cs typeface="+mn-cs"/>
+              </a:defRPr>
+            </a:lvl7pPr>
+            <a:lvl8pPr marL="3429000" indent="-228600" algn="l" defTabSz="914400" rtl="0" eaLnBrk="1" latinLnBrk="0" hangingPunct="1">
+              <a:lnSpc>
+                <a:spcPct val="90000"/>
+              </a:lnSpc>
+              <a:spcBef>
+                <a:spcPct val="30000"/>
+              </a:spcBef>
+              <a:buFont typeface="Arial" panose="020B0604020202020204" pitchFamily="34" charset="0"/>
+              <a:buChar char="•"/>
+              <a:defRPr sz="1800" kern="1200">
+                <a:solidFill>
+                  <a:schemeClr val="tx1"/>
+                </a:solidFill>
+                <a:latin typeface="+mn-lt"/>
+                <a:ea typeface="+mn-ea"/>
+                <a:cs typeface="+mn-cs"/>
+              </a:defRPr>
+            </a:lvl8pPr>
+            <a:lvl9pPr marL="3886200" indent="-228600" algn="l" defTabSz="914400" rtl="0" eaLnBrk="1" latinLnBrk="0" hangingPunct="1">
+              <a:lnSpc>
+                <a:spcPct val="90000"/>
+              </a:lnSpc>
+              <a:spcBef>
+                <a:spcPct val="30000"/>
+              </a:spcBef>
+              <a:buFont typeface="Arial" panose="020B0604020202020204" pitchFamily="34" charset="0"/>
+              <a:buChar char="•"/>
+              <a:defRPr sz="1800" kern="1200">
+                <a:solidFill>
+                  <a:schemeClr val="tx1"/>
+                </a:solidFill>
+                <a:latin typeface="+mn-lt"/>
+                <a:ea typeface="+mn-ea"/>
+                <a:cs typeface="+mn-cs"/>
+              </a:defRPr>
+            </a:lvl9pPr>
+          </a:lstStyle>
+          <a:p>
+            <a:pPr marL="0" indent="0" algn="ctr">
+              <a:lnSpc>
+                <a:spcPct val="100000"/>
+              </a:lnSpc>
+              <a:spcBef>
+                <a:spcPts val="300"/>
+              </a:spcBef>
+              <a:buNone/>
+            </a:pPr>
+            <a:r>
+              <a:rPr lang="en-GB" sz="1200" dirty="0">
+                <a:solidFill>
+                  <a:srgbClr val="0B5394"/>
+                </a:solidFill>
+                <a:latin typeface="Arial" panose="020B0604020202020204" pitchFamily="34" charset="0"/>
+                <a:cs typeface="Arial" panose="020B0604020202020204" pitchFamily="34" charset="0"/>
+              </a:rPr>
+              <a:t>Edit code</a:t>
+            </a:r>
+          </a:p>
+        </p:txBody>
+      </p:sp>
+      <p:sp>
+        <p:nvSpPr>
+          <p:cNvPr id="20" name="Espace réservé du contenu 3">
+            <a:extLst>
+              <a:ext uri="{FF2B5EF4-FFF2-40B4-BE49-F238E27FC236}">
+                <a16:creationId xmlns:a16="http://schemas.microsoft.com/office/drawing/2014/main" id="{1D630107-E41B-200D-97F5-CA79F7CC1683}"/>
+              </a:ext>
+            </a:extLst>
+          </p:cNvPr>
+          <p:cNvSpPr txBox="1">
+            <a:spLocks/>
+          </p:cNvSpPr>
+          <p:nvPr/>
+        </p:nvSpPr>
+        <p:spPr>
+          <a:xfrm>
+            <a:off x="368398" y="2233786"/>
+            <a:ext cx="1801906" cy="276999"/>
+          </a:xfrm>
+          <a:prstGeom prst="rect">
+            <a:avLst/>
+          </a:prstGeom>
+          <a:ln>
+            <a:solidFill>
+              <a:srgbClr val="70ADAB"/>
+            </a:solidFill>
+          </a:ln>
+        </p:spPr>
+        <p:txBody>
+          <a:bodyPr vert="horz" wrap="square" lIns="91440" tIns="45720" rIns="91440" bIns="45720" rtlCol="0">
+            <a:spAutoFit/>
+          </a:bodyPr>
+          <a:lstStyle>
+            <a:lvl1pPr marL="228600" indent="-228600" algn="l" defTabSz="914400" rtl="0" eaLnBrk="1" latinLnBrk="0" hangingPunct="1">
+              <a:lnSpc>
+                <a:spcPct val="90000"/>
+              </a:lnSpc>
+              <a:spcBef>
+                <a:spcPct val="30000"/>
+              </a:spcBef>
+              <a:buFont typeface="Arial" panose="020B0604020202020204" pitchFamily="34" charset="0"/>
+              <a:buChar char="•"/>
+              <a:defRPr sz="2800" kern="1200">
+                <a:solidFill>
+                  <a:schemeClr val="tx1"/>
+                </a:solidFill>
+                <a:latin typeface="+mn-lt"/>
+                <a:ea typeface="+mn-ea"/>
+                <a:cs typeface="+mn-cs"/>
+              </a:defRPr>
+            </a:lvl1pPr>
+            <a:lvl2pPr marL="685800" indent="-228600" algn="l" defTabSz="914400" rtl="0" eaLnBrk="1" latinLnBrk="0" hangingPunct="1">
+              <a:lnSpc>
+                <a:spcPct val="90000"/>
+              </a:lnSpc>
+              <a:spcBef>
+                <a:spcPct val="30000"/>
+              </a:spcBef>
+              <a:buFont typeface="Arial" panose="020B0604020202020204" pitchFamily="34" charset="0"/>
+              <a:buChar char="•"/>
+              <a:defRPr sz="2400" kern="1200">
+                <a:solidFill>
+                  <a:schemeClr val="tx1"/>
+                </a:solidFill>
+                <a:latin typeface="+mn-lt"/>
+                <a:ea typeface="+mn-ea"/>
+                <a:cs typeface="+mn-cs"/>
+              </a:defRPr>
+            </a:lvl2pPr>
+            <a:lvl3pPr marL="1143000" indent="-228600" algn="l" defTabSz="914400" rtl="0" eaLnBrk="1" latinLnBrk="0" hangingPunct="1">
+              <a:lnSpc>
+                <a:spcPct val="90000"/>
+              </a:lnSpc>
+              <a:spcBef>
+                <a:spcPct val="30000"/>
+              </a:spcBef>
+              <a:buFont typeface="Arial" panose="020B0604020202020204" pitchFamily="34" charset="0"/>
+              <a:buChar char="•"/>
+              <a:defRPr sz="2000" kern="1200">
+                <a:solidFill>
+                  <a:schemeClr val="tx1"/>
+                </a:solidFill>
+                <a:latin typeface="+mn-lt"/>
+                <a:ea typeface="+mn-ea"/>
+                <a:cs typeface="+mn-cs"/>
+              </a:defRPr>
+            </a:lvl3pPr>
+            <a:lvl4pPr marL="1600200" indent="-228600" algn="l" defTabSz="914400" rtl="0" eaLnBrk="1" latinLnBrk="0" hangingPunct="1">
+              <a:lnSpc>
+                <a:spcPct val="90000"/>
+              </a:lnSpc>
+              <a:spcBef>
+                <a:spcPct val="30000"/>
+              </a:spcBef>
+              <a:buFont typeface="Arial" panose="020B0604020202020204" pitchFamily="34" charset="0"/>
+              <a:buChar char="•"/>
+              <a:defRPr sz="1800" kern="1200">
+                <a:solidFill>
+                  <a:schemeClr val="tx1"/>
+                </a:solidFill>
+                <a:latin typeface="+mn-lt"/>
+                <a:ea typeface="+mn-ea"/>
+                <a:cs typeface="+mn-cs"/>
+              </a:defRPr>
+            </a:lvl4pPr>
+            <a:lvl5pPr marL="2057400" indent="-228600" algn="l" defTabSz="914400" rtl="0" eaLnBrk="1" latinLnBrk="0" hangingPunct="1">
+              <a:lnSpc>
+                <a:spcPct val="90000"/>
+              </a:lnSpc>
+              <a:spcBef>
+                <a:spcPct val="30000"/>
+              </a:spcBef>
+              <a:buFont typeface="Arial" panose="020B0604020202020204" pitchFamily="34" charset="0"/>
+              <a:buChar char="•"/>
+              <a:defRPr sz="1800" kern="1200">
+                <a:solidFill>
+                  <a:schemeClr val="tx1"/>
+                </a:solidFill>
+                <a:latin typeface="+mn-lt"/>
+                <a:ea typeface="+mn-ea"/>
+                <a:cs typeface="+mn-cs"/>
+              </a:defRPr>
+            </a:lvl5pPr>
+            <a:lvl6pPr marL="2514600" indent="-228600" algn="l" defTabSz="914400" rtl="0" eaLnBrk="1" latinLnBrk="0" hangingPunct="1">
+              <a:lnSpc>
+                <a:spcPct val="90000"/>
+              </a:lnSpc>
+              <a:spcBef>
+                <a:spcPct val="30000"/>
+              </a:spcBef>
+              <a:buFont typeface="Arial" panose="020B0604020202020204" pitchFamily="34" charset="0"/>
+              <a:buChar char="•"/>
+              <a:defRPr sz="1800" kern="1200">
+                <a:solidFill>
+                  <a:schemeClr val="tx1"/>
+                </a:solidFill>
+                <a:latin typeface="+mn-lt"/>
+                <a:ea typeface="+mn-ea"/>
+                <a:cs typeface="+mn-cs"/>
+              </a:defRPr>
+            </a:lvl6pPr>
+            <a:lvl7pPr marL="2971800" indent="-228600" algn="l" defTabSz="914400" rtl="0" eaLnBrk="1" latinLnBrk="0" hangingPunct="1">
+              <a:lnSpc>
+                <a:spcPct val="90000"/>
+              </a:lnSpc>
+              <a:spcBef>
+                <a:spcPct val="30000"/>
+              </a:spcBef>
+              <a:buFont typeface="Arial" panose="020B0604020202020204" pitchFamily="34" charset="0"/>
+              <a:buChar char="•"/>
+              <a:defRPr sz="1800" kern="1200">
+                <a:solidFill>
+                  <a:schemeClr val="tx1"/>
+                </a:solidFill>
+                <a:latin typeface="+mn-lt"/>
+                <a:ea typeface="+mn-ea"/>
+                <a:cs typeface="+mn-cs"/>
+              </a:defRPr>
+            </a:lvl7pPr>
+            <a:lvl8pPr marL="3429000" indent="-228600" algn="l" defTabSz="914400" rtl="0" eaLnBrk="1" latinLnBrk="0" hangingPunct="1">
+              <a:lnSpc>
+                <a:spcPct val="90000"/>
+              </a:lnSpc>
+              <a:spcBef>
+                <a:spcPct val="30000"/>
+              </a:spcBef>
+              <a:buFont typeface="Arial" panose="020B0604020202020204" pitchFamily="34" charset="0"/>
+              <a:buChar char="•"/>
+              <a:defRPr sz="1800" kern="1200">
+                <a:solidFill>
+                  <a:schemeClr val="tx1"/>
+                </a:solidFill>
+                <a:latin typeface="+mn-lt"/>
+                <a:ea typeface="+mn-ea"/>
+                <a:cs typeface="+mn-cs"/>
+              </a:defRPr>
+            </a:lvl8pPr>
+            <a:lvl9pPr marL="3886200" indent="-228600" algn="l" defTabSz="914400" rtl="0" eaLnBrk="1" latinLnBrk="0" hangingPunct="1">
+              <a:lnSpc>
+                <a:spcPct val="90000"/>
+              </a:lnSpc>
+              <a:spcBef>
+                <a:spcPct val="30000"/>
+              </a:spcBef>
+              <a:buFont typeface="Arial" panose="020B0604020202020204" pitchFamily="34" charset="0"/>
+              <a:buChar char="•"/>
+              <a:defRPr sz="1800" kern="1200">
+                <a:solidFill>
+                  <a:schemeClr val="tx1"/>
+                </a:solidFill>
+                <a:latin typeface="+mn-lt"/>
+                <a:ea typeface="+mn-ea"/>
+                <a:cs typeface="+mn-cs"/>
+              </a:defRPr>
+            </a:lvl9pPr>
+          </a:lstStyle>
+          <a:p>
+            <a:pPr marL="0" indent="0" algn="ctr">
+              <a:lnSpc>
+                <a:spcPct val="100000"/>
+              </a:lnSpc>
+              <a:spcBef>
+                <a:spcPts val="300"/>
+              </a:spcBef>
+              <a:buNone/>
+            </a:pPr>
+            <a:r>
+              <a:rPr lang="en-GB" sz="1200" dirty="0">
+                <a:solidFill>
+                  <a:srgbClr val="0B5394"/>
+                </a:solidFill>
+                <a:latin typeface="Arial" panose="020B0604020202020204" pitchFamily="34" charset="0"/>
+                <a:cs typeface="Arial" panose="020B0604020202020204" pitchFamily="34" charset="0"/>
+              </a:rPr>
+              <a:t>Read &amp; Save to file</a:t>
+            </a:r>
+          </a:p>
+        </p:txBody>
+      </p:sp>
+      <p:sp>
+        <p:nvSpPr>
+          <p:cNvPr id="21" name="Espace réservé du contenu 3">
+            <a:extLst>
+              <a:ext uri="{FF2B5EF4-FFF2-40B4-BE49-F238E27FC236}">
+                <a16:creationId xmlns:a16="http://schemas.microsoft.com/office/drawing/2014/main" id="{3F99D4AB-C2A8-B22D-B6FC-49B166E9BE95}"/>
+              </a:ext>
+            </a:extLst>
+          </p:cNvPr>
+          <p:cNvSpPr txBox="1">
+            <a:spLocks/>
+          </p:cNvSpPr>
+          <p:nvPr/>
+        </p:nvSpPr>
+        <p:spPr>
+          <a:xfrm>
+            <a:off x="368398" y="2666330"/>
+            <a:ext cx="1801906" cy="276999"/>
+          </a:xfrm>
+          <a:prstGeom prst="rect">
+            <a:avLst/>
+          </a:prstGeom>
+          <a:ln>
+            <a:solidFill>
+              <a:srgbClr val="70ADAB"/>
+            </a:solidFill>
+          </a:ln>
+        </p:spPr>
+        <p:txBody>
+          <a:bodyPr vert="horz" wrap="square" lIns="91440" tIns="45720" rIns="91440" bIns="45720" rtlCol="0">
+            <a:spAutoFit/>
+          </a:bodyPr>
+          <a:lstStyle>
+            <a:lvl1pPr marL="228600" indent="-228600" algn="l" defTabSz="914400" rtl="0" eaLnBrk="1" latinLnBrk="0" hangingPunct="1">
+              <a:lnSpc>
+                <a:spcPct val="90000"/>
+              </a:lnSpc>
+              <a:spcBef>
+                <a:spcPct val="30000"/>
+              </a:spcBef>
+              <a:buFont typeface="Arial" panose="020B0604020202020204" pitchFamily="34" charset="0"/>
+              <a:buChar char="•"/>
+              <a:defRPr sz="2800" kern="1200">
+                <a:solidFill>
+                  <a:schemeClr val="tx1"/>
+                </a:solidFill>
+                <a:latin typeface="+mn-lt"/>
+                <a:ea typeface="+mn-ea"/>
+                <a:cs typeface="+mn-cs"/>
+              </a:defRPr>
+            </a:lvl1pPr>
+            <a:lvl2pPr marL="685800" indent="-228600" algn="l" defTabSz="914400" rtl="0" eaLnBrk="1" latinLnBrk="0" hangingPunct="1">
+              <a:lnSpc>
+                <a:spcPct val="90000"/>
+              </a:lnSpc>
+              <a:spcBef>
+                <a:spcPct val="30000"/>
+              </a:spcBef>
+              <a:buFont typeface="Arial" panose="020B0604020202020204" pitchFamily="34" charset="0"/>
+              <a:buChar char="•"/>
+              <a:defRPr sz="2400" kern="1200">
+                <a:solidFill>
+                  <a:schemeClr val="tx1"/>
+                </a:solidFill>
+                <a:latin typeface="+mn-lt"/>
+                <a:ea typeface="+mn-ea"/>
+                <a:cs typeface="+mn-cs"/>
+              </a:defRPr>
+            </a:lvl2pPr>
+            <a:lvl3pPr marL="1143000" indent="-228600" algn="l" defTabSz="914400" rtl="0" eaLnBrk="1" latinLnBrk="0" hangingPunct="1">
+              <a:lnSpc>
+                <a:spcPct val="90000"/>
+              </a:lnSpc>
+              <a:spcBef>
+                <a:spcPct val="30000"/>
+              </a:spcBef>
+              <a:buFont typeface="Arial" panose="020B0604020202020204" pitchFamily="34" charset="0"/>
+              <a:buChar char="•"/>
+              <a:defRPr sz="2000" kern="1200">
+                <a:solidFill>
+                  <a:schemeClr val="tx1"/>
+                </a:solidFill>
+                <a:latin typeface="+mn-lt"/>
+                <a:ea typeface="+mn-ea"/>
+                <a:cs typeface="+mn-cs"/>
+              </a:defRPr>
+            </a:lvl3pPr>
+            <a:lvl4pPr marL="1600200" indent="-228600" algn="l" defTabSz="914400" rtl="0" eaLnBrk="1" latinLnBrk="0" hangingPunct="1">
+              <a:lnSpc>
+                <a:spcPct val="90000"/>
+              </a:lnSpc>
+              <a:spcBef>
+                <a:spcPct val="30000"/>
+              </a:spcBef>
+              <a:buFont typeface="Arial" panose="020B0604020202020204" pitchFamily="34" charset="0"/>
+              <a:buChar char="•"/>
+              <a:defRPr sz="1800" kern="1200">
+                <a:solidFill>
+                  <a:schemeClr val="tx1"/>
+                </a:solidFill>
+                <a:latin typeface="+mn-lt"/>
+                <a:ea typeface="+mn-ea"/>
+                <a:cs typeface="+mn-cs"/>
+              </a:defRPr>
+            </a:lvl4pPr>
+            <a:lvl5pPr marL="2057400" indent="-228600" algn="l" defTabSz="914400" rtl="0" eaLnBrk="1" latinLnBrk="0" hangingPunct="1">
+              <a:lnSpc>
+                <a:spcPct val="90000"/>
+              </a:lnSpc>
+              <a:spcBef>
+                <a:spcPct val="30000"/>
+              </a:spcBef>
+              <a:buFont typeface="Arial" panose="020B0604020202020204" pitchFamily="34" charset="0"/>
+              <a:buChar char="•"/>
+              <a:defRPr sz="1800" kern="1200">
+                <a:solidFill>
+                  <a:schemeClr val="tx1"/>
+                </a:solidFill>
+                <a:latin typeface="+mn-lt"/>
+                <a:ea typeface="+mn-ea"/>
+                <a:cs typeface="+mn-cs"/>
+              </a:defRPr>
+            </a:lvl5pPr>
+            <a:lvl6pPr marL="2514600" indent="-228600" algn="l" defTabSz="914400" rtl="0" eaLnBrk="1" latinLnBrk="0" hangingPunct="1">
+              <a:lnSpc>
+                <a:spcPct val="90000"/>
+              </a:lnSpc>
+              <a:spcBef>
+                <a:spcPct val="30000"/>
+              </a:spcBef>
+              <a:buFont typeface="Arial" panose="020B0604020202020204" pitchFamily="34" charset="0"/>
+              <a:buChar char="•"/>
+              <a:defRPr sz="1800" kern="1200">
+                <a:solidFill>
+                  <a:schemeClr val="tx1"/>
+                </a:solidFill>
+                <a:latin typeface="+mn-lt"/>
+                <a:ea typeface="+mn-ea"/>
+                <a:cs typeface="+mn-cs"/>
+              </a:defRPr>
+            </a:lvl6pPr>
+            <a:lvl7pPr marL="2971800" indent="-228600" algn="l" defTabSz="914400" rtl="0" eaLnBrk="1" latinLnBrk="0" hangingPunct="1">
+              <a:lnSpc>
+                <a:spcPct val="90000"/>
+              </a:lnSpc>
+              <a:spcBef>
+                <a:spcPct val="30000"/>
+              </a:spcBef>
+              <a:buFont typeface="Arial" panose="020B0604020202020204" pitchFamily="34" charset="0"/>
+              <a:buChar char="•"/>
+              <a:defRPr sz="1800" kern="1200">
+                <a:solidFill>
+                  <a:schemeClr val="tx1"/>
+                </a:solidFill>
+                <a:latin typeface="+mn-lt"/>
+                <a:ea typeface="+mn-ea"/>
+                <a:cs typeface="+mn-cs"/>
+              </a:defRPr>
+            </a:lvl7pPr>
+            <a:lvl8pPr marL="3429000" indent="-228600" algn="l" defTabSz="914400" rtl="0" eaLnBrk="1" latinLnBrk="0" hangingPunct="1">
+              <a:lnSpc>
+                <a:spcPct val="90000"/>
+              </a:lnSpc>
+              <a:spcBef>
+                <a:spcPct val="30000"/>
+              </a:spcBef>
+              <a:buFont typeface="Arial" panose="020B0604020202020204" pitchFamily="34" charset="0"/>
+              <a:buChar char="•"/>
+              <a:defRPr sz="1800" kern="1200">
+                <a:solidFill>
+                  <a:schemeClr val="tx1"/>
+                </a:solidFill>
+                <a:latin typeface="+mn-lt"/>
+                <a:ea typeface="+mn-ea"/>
+                <a:cs typeface="+mn-cs"/>
+              </a:defRPr>
+            </a:lvl8pPr>
+            <a:lvl9pPr marL="3886200" indent="-228600" algn="l" defTabSz="914400" rtl="0" eaLnBrk="1" latinLnBrk="0" hangingPunct="1">
+              <a:lnSpc>
+                <a:spcPct val="90000"/>
+              </a:lnSpc>
+              <a:spcBef>
+                <a:spcPct val="30000"/>
+              </a:spcBef>
+              <a:buFont typeface="Arial" panose="020B0604020202020204" pitchFamily="34" charset="0"/>
+              <a:buChar char="•"/>
+              <a:defRPr sz="1800" kern="1200">
+                <a:solidFill>
+                  <a:schemeClr val="tx1"/>
+                </a:solidFill>
+                <a:latin typeface="+mn-lt"/>
+                <a:ea typeface="+mn-ea"/>
+                <a:cs typeface="+mn-cs"/>
+              </a:defRPr>
+            </a:lvl9pPr>
+          </a:lstStyle>
+          <a:p>
+            <a:pPr marL="0" indent="0" algn="ctr">
+              <a:lnSpc>
+                <a:spcPct val="100000"/>
+              </a:lnSpc>
+              <a:spcBef>
+                <a:spcPts val="300"/>
+              </a:spcBef>
+              <a:buNone/>
+            </a:pPr>
+            <a:r>
+              <a:rPr lang="en-GB" sz="1200" dirty="0">
+                <a:solidFill>
+                  <a:srgbClr val="0B5394"/>
+                </a:solidFill>
+                <a:latin typeface="Arial" panose="020B0604020202020204" pitchFamily="34" charset="0"/>
+                <a:cs typeface="Arial" panose="020B0604020202020204" pitchFamily="34" charset="0"/>
+              </a:rPr>
+              <a:t>Compile</a:t>
+            </a:r>
+          </a:p>
+        </p:txBody>
+      </p:sp>
+      <p:sp>
+        <p:nvSpPr>
+          <p:cNvPr id="22" name="Espace réservé du contenu 3">
+            <a:extLst>
+              <a:ext uri="{FF2B5EF4-FFF2-40B4-BE49-F238E27FC236}">
+                <a16:creationId xmlns:a16="http://schemas.microsoft.com/office/drawing/2014/main" id="{D90478A0-9C07-D0FA-B331-6F715870DF52}"/>
+              </a:ext>
+            </a:extLst>
+          </p:cNvPr>
+          <p:cNvSpPr txBox="1">
+            <a:spLocks/>
+          </p:cNvSpPr>
+          <p:nvPr/>
+        </p:nvSpPr>
+        <p:spPr>
+          <a:xfrm>
+            <a:off x="368398" y="3531418"/>
+            <a:ext cx="1801906" cy="276999"/>
+          </a:xfrm>
+          <a:prstGeom prst="rect">
+            <a:avLst/>
+          </a:prstGeom>
+          <a:ln>
+            <a:solidFill>
+              <a:srgbClr val="70ADAB"/>
+            </a:solidFill>
+          </a:ln>
+        </p:spPr>
+        <p:txBody>
+          <a:bodyPr vert="horz" wrap="square" lIns="91440" tIns="45720" rIns="91440" bIns="45720" rtlCol="0">
+            <a:spAutoFit/>
+          </a:bodyPr>
+          <a:lstStyle>
+            <a:lvl1pPr marL="228600" indent="-228600" algn="l" defTabSz="914400" rtl="0" eaLnBrk="1" latinLnBrk="0" hangingPunct="1">
+              <a:lnSpc>
+                <a:spcPct val="90000"/>
+              </a:lnSpc>
+              <a:spcBef>
+                <a:spcPct val="30000"/>
+              </a:spcBef>
+              <a:buFont typeface="Arial" panose="020B0604020202020204" pitchFamily="34" charset="0"/>
+              <a:buChar char="•"/>
+              <a:defRPr sz="2800" kern="1200">
+                <a:solidFill>
+                  <a:schemeClr val="tx1"/>
+                </a:solidFill>
+                <a:latin typeface="+mn-lt"/>
+                <a:ea typeface="+mn-ea"/>
+                <a:cs typeface="+mn-cs"/>
+              </a:defRPr>
+            </a:lvl1pPr>
+            <a:lvl2pPr marL="685800" indent="-228600" algn="l" defTabSz="914400" rtl="0" eaLnBrk="1" latinLnBrk="0" hangingPunct="1">
+              <a:lnSpc>
+                <a:spcPct val="90000"/>
+              </a:lnSpc>
+              <a:spcBef>
+                <a:spcPct val="30000"/>
+              </a:spcBef>
+              <a:buFont typeface="Arial" panose="020B0604020202020204" pitchFamily="34" charset="0"/>
+              <a:buChar char="•"/>
+              <a:defRPr sz="2400" kern="1200">
+                <a:solidFill>
+                  <a:schemeClr val="tx1"/>
+                </a:solidFill>
+                <a:latin typeface="+mn-lt"/>
+                <a:ea typeface="+mn-ea"/>
+                <a:cs typeface="+mn-cs"/>
+              </a:defRPr>
+            </a:lvl2pPr>
+            <a:lvl3pPr marL="1143000" indent="-228600" algn="l" defTabSz="914400" rtl="0" eaLnBrk="1" latinLnBrk="0" hangingPunct="1">
+              <a:lnSpc>
+                <a:spcPct val="90000"/>
+              </a:lnSpc>
+              <a:spcBef>
+                <a:spcPct val="30000"/>
+              </a:spcBef>
+              <a:buFont typeface="Arial" panose="020B0604020202020204" pitchFamily="34" charset="0"/>
+              <a:buChar char="•"/>
+              <a:defRPr sz="2000" kern="1200">
+                <a:solidFill>
+                  <a:schemeClr val="tx1"/>
+                </a:solidFill>
+                <a:latin typeface="+mn-lt"/>
+                <a:ea typeface="+mn-ea"/>
+                <a:cs typeface="+mn-cs"/>
+              </a:defRPr>
+            </a:lvl3pPr>
+            <a:lvl4pPr marL="1600200" indent="-228600" algn="l" defTabSz="914400" rtl="0" eaLnBrk="1" latinLnBrk="0" hangingPunct="1">
+              <a:lnSpc>
+                <a:spcPct val="90000"/>
+              </a:lnSpc>
+              <a:spcBef>
+                <a:spcPct val="30000"/>
+              </a:spcBef>
+              <a:buFont typeface="Arial" panose="020B0604020202020204" pitchFamily="34" charset="0"/>
+              <a:buChar char="•"/>
+              <a:defRPr sz="1800" kern="1200">
+                <a:solidFill>
+                  <a:schemeClr val="tx1"/>
+                </a:solidFill>
+                <a:latin typeface="+mn-lt"/>
+                <a:ea typeface="+mn-ea"/>
+                <a:cs typeface="+mn-cs"/>
+              </a:defRPr>
+            </a:lvl4pPr>
+            <a:lvl5pPr marL="2057400" indent="-228600" algn="l" defTabSz="914400" rtl="0" eaLnBrk="1" latinLnBrk="0" hangingPunct="1">
+              <a:lnSpc>
+                <a:spcPct val="90000"/>
+              </a:lnSpc>
+              <a:spcBef>
+                <a:spcPct val="30000"/>
+              </a:spcBef>
+              <a:buFont typeface="Arial" panose="020B0604020202020204" pitchFamily="34" charset="0"/>
+              <a:buChar char="•"/>
+              <a:defRPr sz="1800" kern="1200">
+                <a:solidFill>
+                  <a:schemeClr val="tx1"/>
+                </a:solidFill>
+                <a:latin typeface="+mn-lt"/>
+                <a:ea typeface="+mn-ea"/>
+                <a:cs typeface="+mn-cs"/>
+              </a:defRPr>
+            </a:lvl5pPr>
+            <a:lvl6pPr marL="2514600" indent="-228600" algn="l" defTabSz="914400" rtl="0" eaLnBrk="1" latinLnBrk="0" hangingPunct="1">
+              <a:lnSpc>
+                <a:spcPct val="90000"/>
+              </a:lnSpc>
+              <a:spcBef>
+                <a:spcPct val="30000"/>
+              </a:spcBef>
+              <a:buFont typeface="Arial" panose="020B0604020202020204" pitchFamily="34" charset="0"/>
+              <a:buChar char="•"/>
+              <a:defRPr sz="1800" kern="1200">
+                <a:solidFill>
+                  <a:schemeClr val="tx1"/>
+                </a:solidFill>
+                <a:latin typeface="+mn-lt"/>
+                <a:ea typeface="+mn-ea"/>
+                <a:cs typeface="+mn-cs"/>
+              </a:defRPr>
+            </a:lvl6pPr>
+            <a:lvl7pPr marL="2971800" indent="-228600" algn="l" defTabSz="914400" rtl="0" eaLnBrk="1" latinLnBrk="0" hangingPunct="1">
+              <a:lnSpc>
+                <a:spcPct val="90000"/>
+              </a:lnSpc>
+              <a:spcBef>
+                <a:spcPct val="30000"/>
+              </a:spcBef>
+              <a:buFont typeface="Arial" panose="020B0604020202020204" pitchFamily="34" charset="0"/>
+              <a:buChar char="•"/>
+              <a:defRPr sz="1800" kern="1200">
+                <a:solidFill>
+                  <a:schemeClr val="tx1"/>
+                </a:solidFill>
+                <a:latin typeface="+mn-lt"/>
+                <a:ea typeface="+mn-ea"/>
+                <a:cs typeface="+mn-cs"/>
+              </a:defRPr>
+            </a:lvl7pPr>
+            <a:lvl8pPr marL="3429000" indent="-228600" algn="l" defTabSz="914400" rtl="0" eaLnBrk="1" latinLnBrk="0" hangingPunct="1">
+              <a:lnSpc>
+                <a:spcPct val="90000"/>
+              </a:lnSpc>
+              <a:spcBef>
+                <a:spcPct val="30000"/>
+              </a:spcBef>
+              <a:buFont typeface="Arial" panose="020B0604020202020204" pitchFamily="34" charset="0"/>
+              <a:buChar char="•"/>
+              <a:defRPr sz="1800" kern="1200">
+                <a:solidFill>
+                  <a:schemeClr val="tx1"/>
+                </a:solidFill>
+                <a:latin typeface="+mn-lt"/>
+                <a:ea typeface="+mn-ea"/>
+                <a:cs typeface="+mn-cs"/>
+              </a:defRPr>
+            </a:lvl8pPr>
+            <a:lvl9pPr marL="3886200" indent="-228600" algn="l" defTabSz="914400" rtl="0" eaLnBrk="1" latinLnBrk="0" hangingPunct="1">
+              <a:lnSpc>
+                <a:spcPct val="90000"/>
+              </a:lnSpc>
+              <a:spcBef>
+                <a:spcPct val="30000"/>
+              </a:spcBef>
+              <a:buFont typeface="Arial" panose="020B0604020202020204" pitchFamily="34" charset="0"/>
+              <a:buChar char="•"/>
+              <a:defRPr sz="1800" kern="1200">
+                <a:solidFill>
+                  <a:schemeClr val="tx1"/>
+                </a:solidFill>
+                <a:latin typeface="+mn-lt"/>
+                <a:ea typeface="+mn-ea"/>
+                <a:cs typeface="+mn-cs"/>
+              </a:defRPr>
+            </a:lvl9pPr>
+          </a:lstStyle>
+          <a:p>
+            <a:pPr marL="0" indent="0" algn="ctr">
+              <a:lnSpc>
+                <a:spcPct val="100000"/>
+              </a:lnSpc>
+              <a:spcBef>
+                <a:spcPts val="300"/>
+              </a:spcBef>
+              <a:buNone/>
+            </a:pPr>
+            <a:r>
+              <a:rPr lang="en-GB" sz="1200" dirty="0">
+                <a:solidFill>
+                  <a:srgbClr val="0B5394"/>
+                </a:solidFill>
+                <a:latin typeface="Arial" panose="020B0604020202020204" pitchFamily="34" charset="0"/>
+                <a:cs typeface="Arial" panose="020B0604020202020204" pitchFamily="34" charset="0"/>
+              </a:rPr>
+              <a:t>Deploy</a:t>
+            </a:r>
+          </a:p>
+        </p:txBody>
+      </p:sp>
+      <p:sp>
+        <p:nvSpPr>
+          <p:cNvPr id="23" name="Espace réservé du contenu 3">
+            <a:extLst>
+              <a:ext uri="{FF2B5EF4-FFF2-40B4-BE49-F238E27FC236}">
+                <a16:creationId xmlns:a16="http://schemas.microsoft.com/office/drawing/2014/main" id="{809CB4E5-F798-8269-B183-06F984AB4476}"/>
+              </a:ext>
+            </a:extLst>
+          </p:cNvPr>
+          <p:cNvSpPr txBox="1">
+            <a:spLocks/>
+          </p:cNvSpPr>
+          <p:nvPr/>
+        </p:nvSpPr>
+        <p:spPr>
+          <a:xfrm>
+            <a:off x="368398" y="3963962"/>
+            <a:ext cx="1801906" cy="276999"/>
+          </a:xfrm>
+          <a:prstGeom prst="rect">
+            <a:avLst/>
+          </a:prstGeom>
+          <a:ln>
+            <a:solidFill>
+              <a:srgbClr val="70ADAB"/>
+            </a:solidFill>
+          </a:ln>
+        </p:spPr>
+        <p:txBody>
+          <a:bodyPr vert="horz" wrap="square" lIns="91440" tIns="45720" rIns="91440" bIns="45720" rtlCol="0">
+            <a:spAutoFit/>
+          </a:bodyPr>
+          <a:lstStyle>
+            <a:lvl1pPr marL="228600" indent="-228600" algn="l" defTabSz="914400" rtl="0" eaLnBrk="1" latinLnBrk="0" hangingPunct="1">
+              <a:lnSpc>
+                <a:spcPct val="90000"/>
+              </a:lnSpc>
+              <a:spcBef>
+                <a:spcPct val="30000"/>
+              </a:spcBef>
+              <a:buFont typeface="Arial" panose="020B0604020202020204" pitchFamily="34" charset="0"/>
+              <a:buChar char="•"/>
+              <a:defRPr sz="2800" kern="1200">
+                <a:solidFill>
+                  <a:schemeClr val="tx1"/>
+                </a:solidFill>
+                <a:latin typeface="+mn-lt"/>
+                <a:ea typeface="+mn-ea"/>
+                <a:cs typeface="+mn-cs"/>
+              </a:defRPr>
+            </a:lvl1pPr>
+            <a:lvl2pPr marL="685800" indent="-228600" algn="l" defTabSz="914400" rtl="0" eaLnBrk="1" latinLnBrk="0" hangingPunct="1">
+              <a:lnSpc>
+                <a:spcPct val="90000"/>
+              </a:lnSpc>
+              <a:spcBef>
+                <a:spcPct val="30000"/>
+              </a:spcBef>
+              <a:buFont typeface="Arial" panose="020B0604020202020204" pitchFamily="34" charset="0"/>
+              <a:buChar char="•"/>
+              <a:defRPr sz="2400" kern="1200">
+                <a:solidFill>
+                  <a:schemeClr val="tx1"/>
+                </a:solidFill>
+                <a:latin typeface="+mn-lt"/>
+                <a:ea typeface="+mn-ea"/>
+                <a:cs typeface="+mn-cs"/>
+              </a:defRPr>
+            </a:lvl2pPr>
+            <a:lvl3pPr marL="1143000" indent="-228600" algn="l" defTabSz="914400" rtl="0" eaLnBrk="1" latinLnBrk="0" hangingPunct="1">
+              <a:lnSpc>
+                <a:spcPct val="90000"/>
+              </a:lnSpc>
+              <a:spcBef>
+                <a:spcPct val="30000"/>
+              </a:spcBef>
+              <a:buFont typeface="Arial" panose="020B0604020202020204" pitchFamily="34" charset="0"/>
+              <a:buChar char="•"/>
+              <a:defRPr sz="2000" kern="1200">
+                <a:solidFill>
+                  <a:schemeClr val="tx1"/>
+                </a:solidFill>
+                <a:latin typeface="+mn-lt"/>
+                <a:ea typeface="+mn-ea"/>
+                <a:cs typeface="+mn-cs"/>
+              </a:defRPr>
+            </a:lvl3pPr>
+            <a:lvl4pPr marL="1600200" indent="-228600" algn="l" defTabSz="914400" rtl="0" eaLnBrk="1" latinLnBrk="0" hangingPunct="1">
+              <a:lnSpc>
+                <a:spcPct val="90000"/>
+              </a:lnSpc>
+              <a:spcBef>
+                <a:spcPct val="30000"/>
+              </a:spcBef>
+              <a:buFont typeface="Arial" panose="020B0604020202020204" pitchFamily="34" charset="0"/>
+              <a:buChar char="•"/>
+              <a:defRPr sz="1800" kern="1200">
+                <a:solidFill>
+                  <a:schemeClr val="tx1"/>
+                </a:solidFill>
+                <a:latin typeface="+mn-lt"/>
+                <a:ea typeface="+mn-ea"/>
+                <a:cs typeface="+mn-cs"/>
+              </a:defRPr>
+            </a:lvl4pPr>
+            <a:lvl5pPr marL="2057400" indent="-228600" algn="l" defTabSz="914400" rtl="0" eaLnBrk="1" latinLnBrk="0" hangingPunct="1">
+              <a:lnSpc>
+                <a:spcPct val="90000"/>
+              </a:lnSpc>
+              <a:spcBef>
+                <a:spcPct val="30000"/>
+              </a:spcBef>
+              <a:buFont typeface="Arial" panose="020B0604020202020204" pitchFamily="34" charset="0"/>
+              <a:buChar char="•"/>
+              <a:defRPr sz="1800" kern="1200">
+                <a:solidFill>
+                  <a:schemeClr val="tx1"/>
+                </a:solidFill>
+                <a:latin typeface="+mn-lt"/>
+                <a:ea typeface="+mn-ea"/>
+                <a:cs typeface="+mn-cs"/>
+              </a:defRPr>
+            </a:lvl5pPr>
+            <a:lvl6pPr marL="2514600" indent="-228600" algn="l" defTabSz="914400" rtl="0" eaLnBrk="1" latinLnBrk="0" hangingPunct="1">
+              <a:lnSpc>
+                <a:spcPct val="90000"/>
+              </a:lnSpc>
+              <a:spcBef>
+                <a:spcPct val="30000"/>
+              </a:spcBef>
+              <a:buFont typeface="Arial" panose="020B0604020202020204" pitchFamily="34" charset="0"/>
+              <a:buChar char="•"/>
+              <a:defRPr sz="1800" kern="1200">
+                <a:solidFill>
+                  <a:schemeClr val="tx1"/>
+                </a:solidFill>
+                <a:latin typeface="+mn-lt"/>
+                <a:ea typeface="+mn-ea"/>
+                <a:cs typeface="+mn-cs"/>
+              </a:defRPr>
+            </a:lvl6pPr>
+            <a:lvl7pPr marL="2971800" indent="-228600" algn="l" defTabSz="914400" rtl="0" eaLnBrk="1" latinLnBrk="0" hangingPunct="1">
+              <a:lnSpc>
+                <a:spcPct val="90000"/>
+              </a:lnSpc>
+              <a:spcBef>
+                <a:spcPct val="30000"/>
+              </a:spcBef>
+              <a:buFont typeface="Arial" panose="020B0604020202020204" pitchFamily="34" charset="0"/>
+              <a:buChar char="•"/>
+              <a:defRPr sz="1800" kern="1200">
+                <a:solidFill>
+                  <a:schemeClr val="tx1"/>
+                </a:solidFill>
+                <a:latin typeface="+mn-lt"/>
+                <a:ea typeface="+mn-ea"/>
+                <a:cs typeface="+mn-cs"/>
+              </a:defRPr>
+            </a:lvl7pPr>
+            <a:lvl8pPr marL="3429000" indent="-228600" algn="l" defTabSz="914400" rtl="0" eaLnBrk="1" latinLnBrk="0" hangingPunct="1">
+              <a:lnSpc>
+                <a:spcPct val="90000"/>
+              </a:lnSpc>
+              <a:spcBef>
+                <a:spcPct val="30000"/>
+              </a:spcBef>
+              <a:buFont typeface="Arial" panose="020B0604020202020204" pitchFamily="34" charset="0"/>
+              <a:buChar char="•"/>
+              <a:defRPr sz="1800" kern="1200">
+                <a:solidFill>
+                  <a:schemeClr val="tx1"/>
+                </a:solidFill>
+                <a:latin typeface="+mn-lt"/>
+                <a:ea typeface="+mn-ea"/>
+                <a:cs typeface="+mn-cs"/>
+              </a:defRPr>
+            </a:lvl8pPr>
+            <a:lvl9pPr marL="3886200" indent="-228600" algn="l" defTabSz="914400" rtl="0" eaLnBrk="1" latinLnBrk="0" hangingPunct="1">
+              <a:lnSpc>
+                <a:spcPct val="90000"/>
+              </a:lnSpc>
+              <a:spcBef>
+                <a:spcPct val="30000"/>
+              </a:spcBef>
+              <a:buFont typeface="Arial" panose="020B0604020202020204" pitchFamily="34" charset="0"/>
+              <a:buChar char="•"/>
+              <a:defRPr sz="1800" kern="1200">
+                <a:solidFill>
+                  <a:schemeClr val="tx1"/>
+                </a:solidFill>
+                <a:latin typeface="+mn-lt"/>
+                <a:ea typeface="+mn-ea"/>
+                <a:cs typeface="+mn-cs"/>
+              </a:defRPr>
+            </a:lvl9pPr>
+          </a:lstStyle>
+          <a:p>
+            <a:pPr marL="0" indent="0" algn="ctr">
+              <a:lnSpc>
+                <a:spcPct val="100000"/>
+              </a:lnSpc>
+              <a:spcBef>
+                <a:spcPts val="300"/>
+              </a:spcBef>
+              <a:buNone/>
+            </a:pPr>
+            <a:r>
+              <a:rPr lang="en-GB" sz="1200" dirty="0">
+                <a:solidFill>
+                  <a:srgbClr val="0B5394"/>
+                </a:solidFill>
+                <a:latin typeface="Arial" panose="020B0604020202020204" pitchFamily="34" charset="0"/>
+                <a:cs typeface="Arial" panose="020B0604020202020204" pitchFamily="34" charset="0"/>
+              </a:rPr>
+              <a:t>Test</a:t>
+            </a:r>
+          </a:p>
+        </p:txBody>
+      </p:sp>
+      <p:sp>
+        <p:nvSpPr>
+          <p:cNvPr id="24" name="Espace réservé du contenu 3">
+            <a:extLst>
+              <a:ext uri="{FF2B5EF4-FFF2-40B4-BE49-F238E27FC236}">
+                <a16:creationId xmlns:a16="http://schemas.microsoft.com/office/drawing/2014/main" id="{F541592C-A548-BD6F-19F2-D164BFA84FD1}"/>
+              </a:ext>
+            </a:extLst>
+          </p:cNvPr>
+          <p:cNvSpPr txBox="1">
+            <a:spLocks/>
+          </p:cNvSpPr>
+          <p:nvPr/>
+        </p:nvSpPr>
+        <p:spPr>
+          <a:xfrm>
+            <a:off x="368398" y="3098874"/>
+            <a:ext cx="1801906" cy="276999"/>
+          </a:xfrm>
+          <a:prstGeom prst="rect">
+            <a:avLst/>
+          </a:prstGeom>
+          <a:ln>
+            <a:solidFill>
+              <a:srgbClr val="70ADAB"/>
+            </a:solidFill>
+          </a:ln>
+        </p:spPr>
+        <p:txBody>
+          <a:bodyPr vert="horz" wrap="square" lIns="91440" tIns="45720" rIns="91440" bIns="45720" rtlCol="0">
+            <a:spAutoFit/>
+          </a:bodyPr>
+          <a:lstStyle>
+            <a:lvl1pPr marL="228600" indent="-228600" algn="l" defTabSz="914400" rtl="0" eaLnBrk="1" latinLnBrk="0" hangingPunct="1">
+              <a:lnSpc>
+                <a:spcPct val="90000"/>
+              </a:lnSpc>
+              <a:spcBef>
+                <a:spcPct val="30000"/>
+              </a:spcBef>
+              <a:buFont typeface="Arial" panose="020B0604020202020204" pitchFamily="34" charset="0"/>
+              <a:buChar char="•"/>
+              <a:defRPr sz="2800" kern="1200">
+                <a:solidFill>
+                  <a:schemeClr val="tx1"/>
+                </a:solidFill>
+                <a:latin typeface="+mn-lt"/>
+                <a:ea typeface="+mn-ea"/>
+                <a:cs typeface="+mn-cs"/>
+              </a:defRPr>
+            </a:lvl1pPr>
+            <a:lvl2pPr marL="685800" indent="-228600" algn="l" defTabSz="914400" rtl="0" eaLnBrk="1" latinLnBrk="0" hangingPunct="1">
+              <a:lnSpc>
+                <a:spcPct val="90000"/>
+              </a:lnSpc>
+              <a:spcBef>
+                <a:spcPct val="30000"/>
+              </a:spcBef>
+              <a:buFont typeface="Arial" panose="020B0604020202020204" pitchFamily="34" charset="0"/>
+              <a:buChar char="•"/>
+              <a:defRPr sz="2400" kern="1200">
+                <a:solidFill>
+                  <a:schemeClr val="tx1"/>
+                </a:solidFill>
+                <a:latin typeface="+mn-lt"/>
+                <a:ea typeface="+mn-ea"/>
+                <a:cs typeface="+mn-cs"/>
+              </a:defRPr>
+            </a:lvl2pPr>
+            <a:lvl3pPr marL="1143000" indent="-228600" algn="l" defTabSz="914400" rtl="0" eaLnBrk="1" latinLnBrk="0" hangingPunct="1">
+              <a:lnSpc>
+                <a:spcPct val="90000"/>
+              </a:lnSpc>
+              <a:spcBef>
+                <a:spcPct val="30000"/>
+              </a:spcBef>
+              <a:buFont typeface="Arial" panose="020B0604020202020204" pitchFamily="34" charset="0"/>
+              <a:buChar char="•"/>
+              <a:defRPr sz="2000" kern="1200">
+                <a:solidFill>
+                  <a:schemeClr val="tx1"/>
+                </a:solidFill>
+                <a:latin typeface="+mn-lt"/>
+                <a:ea typeface="+mn-ea"/>
+                <a:cs typeface="+mn-cs"/>
+              </a:defRPr>
+            </a:lvl3pPr>
+            <a:lvl4pPr marL="1600200" indent="-228600" algn="l" defTabSz="914400" rtl="0" eaLnBrk="1" latinLnBrk="0" hangingPunct="1">
+              <a:lnSpc>
+                <a:spcPct val="90000"/>
+              </a:lnSpc>
+              <a:spcBef>
+                <a:spcPct val="30000"/>
+              </a:spcBef>
+              <a:buFont typeface="Arial" panose="020B0604020202020204" pitchFamily="34" charset="0"/>
+              <a:buChar char="•"/>
+              <a:defRPr sz="1800" kern="1200">
+                <a:solidFill>
+                  <a:schemeClr val="tx1"/>
+                </a:solidFill>
+                <a:latin typeface="+mn-lt"/>
+                <a:ea typeface="+mn-ea"/>
+                <a:cs typeface="+mn-cs"/>
+              </a:defRPr>
+            </a:lvl4pPr>
+            <a:lvl5pPr marL="2057400" indent="-228600" algn="l" defTabSz="914400" rtl="0" eaLnBrk="1" latinLnBrk="0" hangingPunct="1">
+              <a:lnSpc>
+                <a:spcPct val="90000"/>
+              </a:lnSpc>
+              <a:spcBef>
+                <a:spcPct val="30000"/>
+              </a:spcBef>
+              <a:buFont typeface="Arial" panose="020B0604020202020204" pitchFamily="34" charset="0"/>
+              <a:buChar char="•"/>
+              <a:defRPr sz="1800" kern="1200">
+                <a:solidFill>
+                  <a:schemeClr val="tx1"/>
+                </a:solidFill>
+                <a:latin typeface="+mn-lt"/>
+                <a:ea typeface="+mn-ea"/>
+                <a:cs typeface="+mn-cs"/>
+              </a:defRPr>
+            </a:lvl5pPr>
+            <a:lvl6pPr marL="2514600" indent="-228600" algn="l" defTabSz="914400" rtl="0" eaLnBrk="1" latinLnBrk="0" hangingPunct="1">
+              <a:lnSpc>
+                <a:spcPct val="90000"/>
+              </a:lnSpc>
+              <a:spcBef>
+                <a:spcPct val="30000"/>
+              </a:spcBef>
+              <a:buFont typeface="Arial" panose="020B0604020202020204" pitchFamily="34" charset="0"/>
+              <a:buChar char="•"/>
+              <a:defRPr sz="1800" kern="1200">
+                <a:solidFill>
+                  <a:schemeClr val="tx1"/>
+                </a:solidFill>
+                <a:latin typeface="+mn-lt"/>
+                <a:ea typeface="+mn-ea"/>
+                <a:cs typeface="+mn-cs"/>
+              </a:defRPr>
+            </a:lvl6pPr>
+            <a:lvl7pPr marL="2971800" indent="-228600" algn="l" defTabSz="914400" rtl="0" eaLnBrk="1" latinLnBrk="0" hangingPunct="1">
+              <a:lnSpc>
+                <a:spcPct val="90000"/>
+              </a:lnSpc>
+              <a:spcBef>
+                <a:spcPct val="30000"/>
+              </a:spcBef>
+              <a:buFont typeface="Arial" panose="020B0604020202020204" pitchFamily="34" charset="0"/>
+              <a:buChar char="•"/>
+              <a:defRPr sz="1800" kern="1200">
+                <a:solidFill>
+                  <a:schemeClr val="tx1"/>
+                </a:solidFill>
+                <a:latin typeface="+mn-lt"/>
+                <a:ea typeface="+mn-ea"/>
+                <a:cs typeface="+mn-cs"/>
+              </a:defRPr>
+            </a:lvl7pPr>
+            <a:lvl8pPr marL="3429000" indent="-228600" algn="l" defTabSz="914400" rtl="0" eaLnBrk="1" latinLnBrk="0" hangingPunct="1">
+              <a:lnSpc>
+                <a:spcPct val="90000"/>
+              </a:lnSpc>
+              <a:spcBef>
+                <a:spcPct val="30000"/>
+              </a:spcBef>
+              <a:buFont typeface="Arial" panose="020B0604020202020204" pitchFamily="34" charset="0"/>
+              <a:buChar char="•"/>
+              <a:defRPr sz="1800" kern="1200">
+                <a:solidFill>
+                  <a:schemeClr val="tx1"/>
+                </a:solidFill>
+                <a:latin typeface="+mn-lt"/>
+                <a:ea typeface="+mn-ea"/>
+                <a:cs typeface="+mn-cs"/>
+              </a:defRPr>
+            </a:lvl8pPr>
+            <a:lvl9pPr marL="3886200" indent="-228600" algn="l" defTabSz="914400" rtl="0" eaLnBrk="1" latinLnBrk="0" hangingPunct="1">
+              <a:lnSpc>
+                <a:spcPct val="90000"/>
+              </a:lnSpc>
+              <a:spcBef>
+                <a:spcPct val="30000"/>
+              </a:spcBef>
+              <a:buFont typeface="Arial" panose="020B0604020202020204" pitchFamily="34" charset="0"/>
+              <a:buChar char="•"/>
+              <a:defRPr sz="1800" kern="1200">
+                <a:solidFill>
+                  <a:schemeClr val="tx1"/>
+                </a:solidFill>
+                <a:latin typeface="+mn-lt"/>
+                <a:ea typeface="+mn-ea"/>
+                <a:cs typeface="+mn-cs"/>
+              </a:defRPr>
+            </a:lvl9pPr>
+          </a:lstStyle>
+          <a:p>
+            <a:pPr marL="0" indent="0" algn="ctr">
+              <a:lnSpc>
+                <a:spcPct val="100000"/>
+              </a:lnSpc>
+              <a:spcBef>
+                <a:spcPts val="300"/>
+              </a:spcBef>
+              <a:buNone/>
+            </a:pPr>
+            <a:r>
+              <a:rPr lang="en-GB" sz="1200" dirty="0">
+                <a:solidFill>
+                  <a:srgbClr val="0B5394"/>
+                </a:solidFill>
+                <a:latin typeface="Arial" panose="020B0604020202020204" pitchFamily="34" charset="0"/>
+                <a:cs typeface="Arial" panose="020B0604020202020204" pitchFamily="34" charset="0"/>
+              </a:rPr>
+              <a:t>Code test environment</a:t>
+            </a:r>
+          </a:p>
+        </p:txBody>
+      </p:sp>
+      <p:sp>
+        <p:nvSpPr>
+          <p:cNvPr id="25" name="TextBox 24">
+            <a:extLst>
+              <a:ext uri="{FF2B5EF4-FFF2-40B4-BE49-F238E27FC236}">
+                <a16:creationId xmlns:a16="http://schemas.microsoft.com/office/drawing/2014/main" id="{4EB9E392-91E6-B436-EE8F-E8CC1A242E9A}"/>
+              </a:ext>
+            </a:extLst>
+          </p:cNvPr>
+          <p:cNvSpPr txBox="1"/>
+          <p:nvPr/>
+        </p:nvSpPr>
+        <p:spPr>
+          <a:xfrm>
+            <a:off x="2510116" y="1391734"/>
+            <a:ext cx="775905" cy="307777"/>
+          </a:xfrm>
+          <a:prstGeom prst="rect">
+            <a:avLst/>
+          </a:prstGeom>
+          <a:noFill/>
+        </p:spPr>
+        <p:txBody>
+          <a:bodyPr wrap="square">
+            <a:spAutoFit/>
+          </a:bodyPr>
+          <a:lstStyle/>
+          <a:p>
+            <a:pPr algn="ctr"/>
+            <a:r>
+              <a:rPr lang="en-LU" dirty="0"/>
+              <a:t>Remix</a:t>
+            </a:r>
+          </a:p>
+        </p:txBody>
+      </p:sp>
+      <p:cxnSp>
+        <p:nvCxnSpPr>
+          <p:cNvPr id="26" name="Elbow Connector 25">
+            <a:extLst>
+              <a:ext uri="{FF2B5EF4-FFF2-40B4-BE49-F238E27FC236}">
+                <a16:creationId xmlns:a16="http://schemas.microsoft.com/office/drawing/2014/main" id="{5B9482AD-B8C4-F9E3-B7BE-3709DF4F83A6}"/>
+              </a:ext>
+            </a:extLst>
+          </p:cNvPr>
+          <p:cNvCxnSpPr>
+            <a:cxnSpLocks/>
+          </p:cNvCxnSpPr>
+          <p:nvPr/>
+        </p:nvCxnSpPr>
+        <p:spPr>
+          <a:xfrm rot="5400000" flipH="1" flipV="1">
+            <a:off x="2312971" y="2404304"/>
+            <a:ext cx="1072320" cy="5731"/>
+          </a:xfrm>
+          <a:prstGeom prst="bentConnector3">
+            <a:avLst/>
+          </a:prstGeom>
+          <a:ln>
+            <a:headEnd type="triangle"/>
+            <a:tailEnd type="triangle"/>
+          </a:ln>
+        </p:spPr>
+        <p:style>
+          <a:lnRef idx="1">
+            <a:schemeClr val="accent1"/>
+          </a:lnRef>
+          <a:fillRef idx="0">
+            <a:schemeClr val="accent1"/>
+          </a:fillRef>
+          <a:effectRef idx="0">
+            <a:schemeClr val="accent1"/>
+          </a:effectRef>
+          <a:fontRef idx="minor">
+            <a:schemeClr val="tx1"/>
+          </a:fontRef>
+        </p:style>
+      </p:cxnSp>
+      <p:sp>
+        <p:nvSpPr>
+          <p:cNvPr id="29" name="TextBox 28">
+            <a:extLst>
+              <a:ext uri="{FF2B5EF4-FFF2-40B4-BE49-F238E27FC236}">
+                <a16:creationId xmlns:a16="http://schemas.microsoft.com/office/drawing/2014/main" id="{BFA6BC6B-06CE-C28B-1440-4339846777E8}"/>
+              </a:ext>
+            </a:extLst>
+          </p:cNvPr>
+          <p:cNvSpPr txBox="1"/>
+          <p:nvPr/>
+        </p:nvSpPr>
+        <p:spPr>
+          <a:xfrm>
+            <a:off x="4312753" y="1391734"/>
+            <a:ext cx="860902" cy="307777"/>
+          </a:xfrm>
+          <a:prstGeom prst="rect">
+            <a:avLst/>
+          </a:prstGeom>
+          <a:noFill/>
+        </p:spPr>
+        <p:txBody>
+          <a:bodyPr wrap="square">
+            <a:spAutoFit/>
+          </a:bodyPr>
+          <a:lstStyle/>
+          <a:p>
+            <a:pPr algn="ctr"/>
+            <a:r>
+              <a:rPr lang="en-LU" dirty="0"/>
+              <a:t>VSCode</a:t>
+            </a:r>
+          </a:p>
+        </p:txBody>
+      </p:sp>
+      <p:cxnSp>
+        <p:nvCxnSpPr>
+          <p:cNvPr id="33" name="Elbow Connector 32">
+            <a:extLst>
+              <a:ext uri="{FF2B5EF4-FFF2-40B4-BE49-F238E27FC236}">
+                <a16:creationId xmlns:a16="http://schemas.microsoft.com/office/drawing/2014/main" id="{C8543FE1-97F7-250D-6DC8-DE27B47E7966}"/>
+              </a:ext>
+            </a:extLst>
+          </p:cNvPr>
+          <p:cNvCxnSpPr>
+            <a:cxnSpLocks/>
+          </p:cNvCxnSpPr>
+          <p:nvPr/>
+        </p:nvCxnSpPr>
+        <p:spPr>
+          <a:xfrm rot="5400000" flipH="1" flipV="1">
+            <a:off x="4423316" y="2189188"/>
+            <a:ext cx="639776" cy="3419"/>
+          </a:xfrm>
+          <a:prstGeom prst="bentConnector3">
+            <a:avLst/>
+          </a:prstGeom>
+          <a:ln>
+            <a:headEnd type="triangle"/>
+            <a:tailEnd type="triangle"/>
+          </a:ln>
+        </p:spPr>
+        <p:style>
+          <a:lnRef idx="1">
+            <a:schemeClr val="accent1"/>
+          </a:lnRef>
+          <a:fillRef idx="0">
+            <a:schemeClr val="accent1"/>
+          </a:fillRef>
+          <a:effectRef idx="0">
+            <a:schemeClr val="accent1"/>
+          </a:effectRef>
+          <a:fontRef idx="minor">
+            <a:schemeClr val="tx1"/>
+          </a:fontRef>
+        </p:style>
+      </p:cxnSp>
+      <p:sp>
+        <p:nvSpPr>
+          <p:cNvPr id="34" name="TextBox 33">
+            <a:extLst>
+              <a:ext uri="{FF2B5EF4-FFF2-40B4-BE49-F238E27FC236}">
+                <a16:creationId xmlns:a16="http://schemas.microsoft.com/office/drawing/2014/main" id="{97139C91-AE21-A422-9B03-FA8EF73C7B54}"/>
+              </a:ext>
+            </a:extLst>
+          </p:cNvPr>
+          <p:cNvSpPr txBox="1"/>
+          <p:nvPr/>
+        </p:nvSpPr>
+        <p:spPr>
+          <a:xfrm>
+            <a:off x="5227725" y="1391734"/>
+            <a:ext cx="1074463" cy="307777"/>
+          </a:xfrm>
+          <a:prstGeom prst="rect">
+            <a:avLst/>
+          </a:prstGeom>
+          <a:noFill/>
+        </p:spPr>
+        <p:txBody>
+          <a:bodyPr wrap="square">
+            <a:spAutoFit/>
+          </a:bodyPr>
+          <a:lstStyle/>
+          <a:p>
+            <a:pPr algn="ctr"/>
+            <a:r>
+              <a:rPr lang="en-LU" dirty="0"/>
+              <a:t>JavaScript</a:t>
+            </a:r>
+          </a:p>
+        </p:txBody>
+      </p:sp>
+      <p:cxnSp>
+        <p:nvCxnSpPr>
+          <p:cNvPr id="35" name="Elbow Connector 34">
+            <a:extLst>
+              <a:ext uri="{FF2B5EF4-FFF2-40B4-BE49-F238E27FC236}">
+                <a16:creationId xmlns:a16="http://schemas.microsoft.com/office/drawing/2014/main" id="{D38F4D2B-EE5A-E62A-668F-527DC7593B84}"/>
+              </a:ext>
+            </a:extLst>
+          </p:cNvPr>
+          <p:cNvCxnSpPr>
+            <a:cxnSpLocks/>
+          </p:cNvCxnSpPr>
+          <p:nvPr/>
+        </p:nvCxnSpPr>
+        <p:spPr>
+          <a:xfrm rot="5400000" flipH="1" flipV="1">
+            <a:off x="5562923" y="3257195"/>
+            <a:ext cx="392831" cy="1"/>
+          </a:xfrm>
+          <a:prstGeom prst="bentConnector3">
+            <a:avLst/>
+          </a:prstGeom>
+          <a:ln>
+            <a:headEnd type="triangle"/>
+            <a:tailEnd type="triangle"/>
+          </a:ln>
+        </p:spPr>
+        <p:style>
+          <a:lnRef idx="1">
+            <a:schemeClr val="accent1"/>
+          </a:lnRef>
+          <a:fillRef idx="0">
+            <a:schemeClr val="accent1"/>
+          </a:fillRef>
+          <a:effectRef idx="0">
+            <a:schemeClr val="accent1"/>
+          </a:effectRef>
+          <a:fontRef idx="minor">
+            <a:schemeClr val="tx1"/>
+          </a:fontRef>
+        </p:style>
+      </p:cxnSp>
+      <p:sp>
+        <p:nvSpPr>
+          <p:cNvPr id="36" name="TextBox 35">
+            <a:extLst>
+              <a:ext uri="{FF2B5EF4-FFF2-40B4-BE49-F238E27FC236}">
+                <a16:creationId xmlns:a16="http://schemas.microsoft.com/office/drawing/2014/main" id="{906EFCBB-499B-C512-76E4-C89447DB287F}"/>
+              </a:ext>
+            </a:extLst>
+          </p:cNvPr>
+          <p:cNvSpPr txBox="1"/>
+          <p:nvPr/>
+        </p:nvSpPr>
+        <p:spPr>
+          <a:xfrm>
+            <a:off x="6253078" y="1391733"/>
+            <a:ext cx="1074463" cy="307777"/>
+          </a:xfrm>
+          <a:prstGeom prst="rect">
+            <a:avLst/>
+          </a:prstGeom>
+          <a:noFill/>
+        </p:spPr>
+        <p:txBody>
+          <a:bodyPr wrap="square">
+            <a:spAutoFit/>
+          </a:bodyPr>
+          <a:lstStyle/>
+          <a:p>
+            <a:pPr algn="ctr"/>
+            <a:r>
+              <a:rPr lang="en-LU" dirty="0"/>
+              <a:t>Console</a:t>
+            </a:r>
+          </a:p>
+        </p:txBody>
+      </p:sp>
+      <p:cxnSp>
+        <p:nvCxnSpPr>
+          <p:cNvPr id="38" name="Elbow Connector 37">
+            <a:extLst>
+              <a:ext uri="{FF2B5EF4-FFF2-40B4-BE49-F238E27FC236}">
+                <a16:creationId xmlns:a16="http://schemas.microsoft.com/office/drawing/2014/main" id="{BBA0BAFF-1628-163D-72D7-5314A62E5221}"/>
+              </a:ext>
+            </a:extLst>
+          </p:cNvPr>
+          <p:cNvCxnSpPr>
+            <a:cxnSpLocks/>
+          </p:cNvCxnSpPr>
+          <p:nvPr/>
+        </p:nvCxnSpPr>
+        <p:spPr>
+          <a:xfrm rot="16200000" flipV="1">
+            <a:off x="6146947" y="4036491"/>
+            <a:ext cx="1286727" cy="1"/>
+          </a:xfrm>
+          <a:prstGeom prst="bentConnector3">
+            <a:avLst/>
+          </a:prstGeom>
+          <a:ln>
+            <a:headEnd type="triangle"/>
+            <a:tailEnd type="triangle"/>
+          </a:ln>
+        </p:spPr>
+        <p:style>
+          <a:lnRef idx="1">
+            <a:schemeClr val="accent1"/>
+          </a:lnRef>
+          <a:fillRef idx="0">
+            <a:schemeClr val="accent1"/>
+          </a:fillRef>
+          <a:effectRef idx="0">
+            <a:schemeClr val="accent1"/>
+          </a:effectRef>
+          <a:fontRef idx="minor">
+            <a:schemeClr val="tx1"/>
+          </a:fontRef>
+        </p:style>
+      </p:cxnSp>
+      <p:sp>
+        <p:nvSpPr>
+          <p:cNvPr id="39" name="TextBox 38">
+            <a:extLst>
+              <a:ext uri="{FF2B5EF4-FFF2-40B4-BE49-F238E27FC236}">
+                <a16:creationId xmlns:a16="http://schemas.microsoft.com/office/drawing/2014/main" id="{10868FD4-FBEF-B46C-59C3-20B96018D54F}"/>
+              </a:ext>
+            </a:extLst>
+          </p:cNvPr>
+          <p:cNvSpPr txBox="1"/>
+          <p:nvPr/>
+        </p:nvSpPr>
+        <p:spPr>
+          <a:xfrm>
+            <a:off x="3335310" y="1391733"/>
+            <a:ext cx="860902" cy="307777"/>
+          </a:xfrm>
+          <a:prstGeom prst="rect">
+            <a:avLst/>
+          </a:prstGeom>
+          <a:noFill/>
+        </p:spPr>
+        <p:txBody>
+          <a:bodyPr wrap="square">
+            <a:spAutoFit/>
+          </a:bodyPr>
+          <a:lstStyle/>
+          <a:p>
+            <a:pPr algn="ctr"/>
+            <a:r>
+              <a:rPr lang="en-LU" dirty="0"/>
+              <a:t>Truffle</a:t>
+            </a:r>
+          </a:p>
+        </p:txBody>
+      </p:sp>
+      <p:cxnSp>
+        <p:nvCxnSpPr>
+          <p:cNvPr id="40" name="Elbow Connector 39">
+            <a:extLst>
+              <a:ext uri="{FF2B5EF4-FFF2-40B4-BE49-F238E27FC236}">
+                <a16:creationId xmlns:a16="http://schemas.microsoft.com/office/drawing/2014/main" id="{35B0CB07-427C-FA10-2CF4-3CD432700AF8}"/>
+              </a:ext>
+            </a:extLst>
+          </p:cNvPr>
+          <p:cNvCxnSpPr>
+            <a:cxnSpLocks/>
+          </p:cNvCxnSpPr>
+          <p:nvPr/>
+        </p:nvCxnSpPr>
+        <p:spPr>
+          <a:xfrm rot="5400000" flipH="1" flipV="1">
+            <a:off x="2762173" y="3669917"/>
+            <a:ext cx="2007176" cy="12700"/>
+          </a:xfrm>
+          <a:prstGeom prst="bentConnector3">
+            <a:avLst/>
+          </a:prstGeom>
+          <a:ln>
+            <a:headEnd type="triangle"/>
+            <a:tailEnd type="triangle"/>
+          </a:ln>
+        </p:spPr>
+        <p:style>
+          <a:lnRef idx="1">
+            <a:schemeClr val="accent1"/>
+          </a:lnRef>
+          <a:fillRef idx="0">
+            <a:schemeClr val="accent1"/>
+          </a:fillRef>
+          <a:effectRef idx="0">
+            <a:schemeClr val="accent1"/>
+          </a:effectRef>
+          <a:fontRef idx="minor">
+            <a:schemeClr val="tx1"/>
+          </a:fontRef>
+        </p:style>
+      </p:cxnSp>
+      <p:cxnSp>
+        <p:nvCxnSpPr>
+          <p:cNvPr id="43" name="Elbow Connector 42">
+            <a:extLst>
+              <a:ext uri="{FF2B5EF4-FFF2-40B4-BE49-F238E27FC236}">
+                <a16:creationId xmlns:a16="http://schemas.microsoft.com/office/drawing/2014/main" id="{3AB062FE-A1A8-9E87-E6C1-E3E49E9D1D3A}"/>
+              </a:ext>
+            </a:extLst>
+          </p:cNvPr>
+          <p:cNvCxnSpPr>
+            <a:cxnSpLocks/>
+          </p:cNvCxnSpPr>
+          <p:nvPr/>
+        </p:nvCxnSpPr>
+        <p:spPr>
+          <a:xfrm rot="16200000" flipV="1">
+            <a:off x="2452590" y="3847285"/>
+            <a:ext cx="787351" cy="1"/>
+          </a:xfrm>
+          <a:prstGeom prst="bentConnector3">
+            <a:avLst/>
+          </a:prstGeom>
+          <a:ln>
+            <a:headEnd type="triangle"/>
+            <a:tailEnd type="triangle"/>
+          </a:ln>
+        </p:spPr>
+        <p:style>
+          <a:lnRef idx="1">
+            <a:schemeClr val="accent1"/>
+          </a:lnRef>
+          <a:fillRef idx="0">
+            <a:schemeClr val="accent1"/>
+          </a:fillRef>
+          <a:effectRef idx="0">
+            <a:schemeClr val="accent1"/>
+          </a:effectRef>
+          <a:fontRef idx="minor">
+            <a:schemeClr val="tx1"/>
+          </a:fontRef>
+        </p:style>
+      </p:cxnSp>
+      <p:sp>
+        <p:nvSpPr>
+          <p:cNvPr id="27" name="Espace réservé du contenu 3">
+            <a:extLst>
+              <a:ext uri="{FF2B5EF4-FFF2-40B4-BE49-F238E27FC236}">
+                <a16:creationId xmlns:a16="http://schemas.microsoft.com/office/drawing/2014/main" id="{F4E09AFB-475A-2995-A35D-42F84F3421E0}"/>
+              </a:ext>
+            </a:extLst>
+          </p:cNvPr>
+          <p:cNvSpPr txBox="1">
+            <a:spLocks/>
+          </p:cNvSpPr>
+          <p:nvPr/>
+        </p:nvSpPr>
+        <p:spPr>
+          <a:xfrm>
+            <a:off x="368398" y="4396506"/>
+            <a:ext cx="1801906" cy="276999"/>
+          </a:xfrm>
+          <a:prstGeom prst="rect">
+            <a:avLst/>
+          </a:prstGeom>
+          <a:ln>
+            <a:solidFill>
+              <a:srgbClr val="70ADAB"/>
+            </a:solidFill>
+          </a:ln>
+        </p:spPr>
+        <p:txBody>
+          <a:bodyPr vert="horz" wrap="square" lIns="91440" tIns="45720" rIns="91440" bIns="45720" rtlCol="0">
+            <a:spAutoFit/>
+          </a:bodyPr>
+          <a:lstStyle>
+            <a:lvl1pPr marL="228600" indent="-228600" algn="l" defTabSz="914400" rtl="0" eaLnBrk="1" latinLnBrk="0" hangingPunct="1">
+              <a:lnSpc>
+                <a:spcPct val="90000"/>
+              </a:lnSpc>
+              <a:spcBef>
+                <a:spcPct val="30000"/>
+              </a:spcBef>
+              <a:buFont typeface="Arial" panose="020B0604020202020204" pitchFamily="34" charset="0"/>
+              <a:buChar char="•"/>
+              <a:defRPr sz="2800" kern="1200">
+                <a:solidFill>
+                  <a:schemeClr val="tx1"/>
+                </a:solidFill>
+                <a:latin typeface="+mn-lt"/>
+                <a:ea typeface="+mn-ea"/>
+                <a:cs typeface="+mn-cs"/>
+              </a:defRPr>
+            </a:lvl1pPr>
+            <a:lvl2pPr marL="685800" indent="-228600" algn="l" defTabSz="914400" rtl="0" eaLnBrk="1" latinLnBrk="0" hangingPunct="1">
+              <a:lnSpc>
+                <a:spcPct val="90000"/>
+              </a:lnSpc>
+              <a:spcBef>
+                <a:spcPct val="30000"/>
+              </a:spcBef>
+              <a:buFont typeface="Arial" panose="020B0604020202020204" pitchFamily="34" charset="0"/>
+              <a:buChar char="•"/>
+              <a:defRPr sz="2400" kern="1200">
+                <a:solidFill>
+                  <a:schemeClr val="tx1"/>
+                </a:solidFill>
+                <a:latin typeface="+mn-lt"/>
+                <a:ea typeface="+mn-ea"/>
+                <a:cs typeface="+mn-cs"/>
+              </a:defRPr>
+            </a:lvl2pPr>
+            <a:lvl3pPr marL="1143000" indent="-228600" algn="l" defTabSz="914400" rtl="0" eaLnBrk="1" latinLnBrk="0" hangingPunct="1">
+              <a:lnSpc>
+                <a:spcPct val="90000"/>
+              </a:lnSpc>
+              <a:spcBef>
+                <a:spcPct val="30000"/>
+              </a:spcBef>
+              <a:buFont typeface="Arial" panose="020B0604020202020204" pitchFamily="34" charset="0"/>
+              <a:buChar char="•"/>
+              <a:defRPr sz="2000" kern="1200">
+                <a:solidFill>
+                  <a:schemeClr val="tx1"/>
+                </a:solidFill>
+                <a:latin typeface="+mn-lt"/>
+                <a:ea typeface="+mn-ea"/>
+                <a:cs typeface="+mn-cs"/>
+              </a:defRPr>
+            </a:lvl3pPr>
+            <a:lvl4pPr marL="1600200" indent="-228600" algn="l" defTabSz="914400" rtl="0" eaLnBrk="1" latinLnBrk="0" hangingPunct="1">
+              <a:lnSpc>
+                <a:spcPct val="90000"/>
+              </a:lnSpc>
+              <a:spcBef>
+                <a:spcPct val="30000"/>
+              </a:spcBef>
+              <a:buFont typeface="Arial" panose="020B0604020202020204" pitchFamily="34" charset="0"/>
+              <a:buChar char="•"/>
+              <a:defRPr sz="1800" kern="1200">
+                <a:solidFill>
+                  <a:schemeClr val="tx1"/>
+                </a:solidFill>
+                <a:latin typeface="+mn-lt"/>
+                <a:ea typeface="+mn-ea"/>
+                <a:cs typeface="+mn-cs"/>
+              </a:defRPr>
+            </a:lvl4pPr>
+            <a:lvl5pPr marL="2057400" indent="-228600" algn="l" defTabSz="914400" rtl="0" eaLnBrk="1" latinLnBrk="0" hangingPunct="1">
+              <a:lnSpc>
+                <a:spcPct val="90000"/>
+              </a:lnSpc>
+              <a:spcBef>
+                <a:spcPct val="30000"/>
+              </a:spcBef>
+              <a:buFont typeface="Arial" panose="020B0604020202020204" pitchFamily="34" charset="0"/>
+              <a:buChar char="•"/>
+              <a:defRPr sz="1800" kern="1200">
+                <a:solidFill>
+                  <a:schemeClr val="tx1"/>
+                </a:solidFill>
+                <a:latin typeface="+mn-lt"/>
+                <a:ea typeface="+mn-ea"/>
+                <a:cs typeface="+mn-cs"/>
+              </a:defRPr>
+            </a:lvl5pPr>
+            <a:lvl6pPr marL="2514600" indent="-228600" algn="l" defTabSz="914400" rtl="0" eaLnBrk="1" latinLnBrk="0" hangingPunct="1">
+              <a:lnSpc>
+                <a:spcPct val="90000"/>
+              </a:lnSpc>
+              <a:spcBef>
+                <a:spcPct val="30000"/>
+              </a:spcBef>
+              <a:buFont typeface="Arial" panose="020B0604020202020204" pitchFamily="34" charset="0"/>
+              <a:buChar char="•"/>
+              <a:defRPr sz="1800" kern="1200">
+                <a:solidFill>
+                  <a:schemeClr val="tx1"/>
+                </a:solidFill>
+                <a:latin typeface="+mn-lt"/>
+                <a:ea typeface="+mn-ea"/>
+                <a:cs typeface="+mn-cs"/>
+              </a:defRPr>
+            </a:lvl6pPr>
+            <a:lvl7pPr marL="2971800" indent="-228600" algn="l" defTabSz="914400" rtl="0" eaLnBrk="1" latinLnBrk="0" hangingPunct="1">
+              <a:lnSpc>
+                <a:spcPct val="90000"/>
+              </a:lnSpc>
+              <a:spcBef>
+                <a:spcPct val="30000"/>
+              </a:spcBef>
+              <a:buFont typeface="Arial" panose="020B0604020202020204" pitchFamily="34" charset="0"/>
+              <a:buChar char="•"/>
+              <a:defRPr sz="1800" kern="1200">
+                <a:solidFill>
+                  <a:schemeClr val="tx1"/>
+                </a:solidFill>
+                <a:latin typeface="+mn-lt"/>
+                <a:ea typeface="+mn-ea"/>
+                <a:cs typeface="+mn-cs"/>
+              </a:defRPr>
+            </a:lvl7pPr>
+            <a:lvl8pPr marL="3429000" indent="-228600" algn="l" defTabSz="914400" rtl="0" eaLnBrk="1" latinLnBrk="0" hangingPunct="1">
+              <a:lnSpc>
+                <a:spcPct val="90000"/>
+              </a:lnSpc>
+              <a:spcBef>
+                <a:spcPct val="30000"/>
+              </a:spcBef>
+              <a:buFont typeface="Arial" panose="020B0604020202020204" pitchFamily="34" charset="0"/>
+              <a:buChar char="•"/>
+              <a:defRPr sz="1800" kern="1200">
+                <a:solidFill>
+                  <a:schemeClr val="tx1"/>
+                </a:solidFill>
+                <a:latin typeface="+mn-lt"/>
+                <a:ea typeface="+mn-ea"/>
+                <a:cs typeface="+mn-cs"/>
+              </a:defRPr>
+            </a:lvl8pPr>
+            <a:lvl9pPr marL="3886200" indent="-228600" algn="l" defTabSz="914400" rtl="0" eaLnBrk="1" latinLnBrk="0" hangingPunct="1">
+              <a:lnSpc>
+                <a:spcPct val="90000"/>
+              </a:lnSpc>
+              <a:spcBef>
+                <a:spcPct val="30000"/>
+              </a:spcBef>
+              <a:buFont typeface="Arial" panose="020B0604020202020204" pitchFamily="34" charset="0"/>
+              <a:buChar char="•"/>
+              <a:defRPr sz="1800" kern="1200">
+                <a:solidFill>
+                  <a:schemeClr val="tx1"/>
+                </a:solidFill>
+                <a:latin typeface="+mn-lt"/>
+                <a:ea typeface="+mn-ea"/>
+                <a:cs typeface="+mn-cs"/>
+              </a:defRPr>
+            </a:lvl9pPr>
+          </a:lstStyle>
+          <a:p>
+            <a:pPr marL="0" indent="0" algn="ctr">
+              <a:lnSpc>
+                <a:spcPct val="100000"/>
+              </a:lnSpc>
+              <a:spcBef>
+                <a:spcPts val="300"/>
+              </a:spcBef>
+              <a:buNone/>
+            </a:pPr>
+            <a:r>
+              <a:rPr lang="en-GB" sz="1200" dirty="0">
+                <a:solidFill>
+                  <a:srgbClr val="0B5394"/>
+                </a:solidFill>
+                <a:latin typeface="Arial" panose="020B0604020202020204" pitchFamily="34" charset="0"/>
+                <a:cs typeface="Arial" panose="020B0604020202020204" pitchFamily="34" charset="0"/>
+              </a:rPr>
+              <a:t>Production</a:t>
+            </a:r>
+          </a:p>
+        </p:txBody>
+      </p:sp>
+      <p:sp>
+        <p:nvSpPr>
+          <p:cNvPr id="31" name="TextBox 30">
+            <a:extLst>
+              <a:ext uri="{FF2B5EF4-FFF2-40B4-BE49-F238E27FC236}">
+                <a16:creationId xmlns:a16="http://schemas.microsoft.com/office/drawing/2014/main" id="{BB2D2119-8B52-80E3-2537-2148DA538580}"/>
+              </a:ext>
+            </a:extLst>
+          </p:cNvPr>
+          <p:cNvSpPr txBox="1"/>
+          <p:nvPr/>
+        </p:nvSpPr>
+        <p:spPr>
+          <a:xfrm>
+            <a:off x="2329976" y="2898746"/>
+            <a:ext cx="1031980" cy="553998"/>
+          </a:xfrm>
+          <a:prstGeom prst="rect">
+            <a:avLst/>
+          </a:prstGeom>
+          <a:noFill/>
+        </p:spPr>
+        <p:txBody>
+          <a:bodyPr wrap="square">
+            <a:spAutoFit/>
+          </a:bodyPr>
+          <a:lstStyle/>
+          <a:p>
+            <a:pPr algn="ctr"/>
+            <a:r>
+              <a:rPr lang="en-GB" sz="1000" dirty="0">
+                <a:solidFill>
+                  <a:srgbClr val="FFC000"/>
+                </a:solidFill>
+              </a:rPr>
+              <a:t>b</a:t>
+            </a:r>
+            <a:r>
+              <a:rPr lang="en-LU" sz="1000" dirty="0">
+                <a:solidFill>
+                  <a:srgbClr val="FFC000"/>
+                </a:solidFill>
+              </a:rPr>
+              <a:t>asic test environment provided</a:t>
+            </a:r>
+          </a:p>
+        </p:txBody>
+      </p:sp>
+      <p:sp>
+        <p:nvSpPr>
+          <p:cNvPr id="37" name="Google Shape;71;p16">
+            <a:extLst>
+              <a:ext uri="{FF2B5EF4-FFF2-40B4-BE49-F238E27FC236}">
+                <a16:creationId xmlns:a16="http://schemas.microsoft.com/office/drawing/2014/main" id="{72643657-5302-7FC1-1064-FC1468CEA377}"/>
+              </a:ext>
+            </a:extLst>
+          </p:cNvPr>
+          <p:cNvSpPr txBox="1">
+            <a:spLocks/>
+          </p:cNvSpPr>
+          <p:nvPr/>
+        </p:nvSpPr>
+        <p:spPr>
+          <a:xfrm>
+            <a:off x="281803" y="887340"/>
+            <a:ext cx="3914409" cy="489898"/>
+          </a:xfrm>
+          <a:prstGeom prst="rect">
+            <a:avLst/>
+          </a:prstGeom>
+          <a:noFill/>
+          <a:ln>
+            <a:noFill/>
+          </a:ln>
+        </p:spPr>
+        <p:txBody>
+          <a:bodyPr spcFirstLastPara="1" wrap="square" lIns="68575" tIns="34275" rIns="68575" bIns="34275" anchor="b" anchorCtr="0">
+            <a:noAutofit/>
+          </a:bodyPr>
+          <a:lstStyle>
+            <a:defPPr marR="0" lvl="0" algn="l" rtl="0">
+              <a:lnSpc>
+                <a:spcPct val="100000"/>
+              </a:lnSpc>
+              <a:spcBef>
+                <a:spcPts val="0"/>
+              </a:spcBef>
+              <a:spcAft>
+                <a:spcPts val="0"/>
+              </a:spcAft>
+            </a:defPPr>
+            <a:lvl1pPr marR="0" lvl="0" algn="l" rtl="0">
+              <a:lnSpc>
+                <a:spcPct val="100000"/>
+              </a:lnSpc>
+              <a:spcBef>
+                <a:spcPts val="0"/>
+              </a:spcBef>
+              <a:spcAft>
+                <a:spcPts val="0"/>
+              </a:spcAft>
+              <a:buClr>
+                <a:schemeClr val="accent6"/>
+              </a:buClr>
+              <a:buSzPts val="2700"/>
+              <a:buFont typeface="Arial"/>
+              <a:buNone/>
+              <a:defRPr sz="2700" b="0" i="0" u="none" strike="noStrike" cap="none">
+                <a:solidFill>
+                  <a:schemeClr val="accent6"/>
+                </a:solidFill>
+                <a:latin typeface="Arial"/>
+                <a:ea typeface="Arial"/>
+                <a:cs typeface="Arial"/>
+                <a:sym typeface="Arial"/>
+              </a:defRPr>
+            </a:lvl1pPr>
+            <a:lvl2pPr marR="0" lvl="1" algn="l" rtl="0">
+              <a:lnSpc>
+                <a:spcPct val="100000"/>
+              </a:lnSpc>
+              <a:spcBef>
+                <a:spcPts val="0"/>
+              </a:spcBef>
+              <a:spcAft>
+                <a:spcPts val="0"/>
+              </a:spcAft>
+              <a:buClr>
+                <a:schemeClr val="dk1"/>
+              </a:buClr>
+              <a:buSzPts val="2800"/>
+              <a:buFont typeface="Arial"/>
+              <a:buNone/>
+              <a:defRPr sz="2800" b="0" i="0" u="none" strike="noStrike" cap="none">
+                <a:solidFill>
+                  <a:schemeClr val="dk1"/>
+                </a:solidFill>
+                <a:latin typeface="Arial"/>
+                <a:ea typeface="Arial"/>
+                <a:cs typeface="Arial"/>
+                <a:sym typeface="Arial"/>
+              </a:defRPr>
+            </a:lvl2pPr>
+            <a:lvl3pPr marR="0" lvl="2" algn="l" rtl="0">
+              <a:lnSpc>
+                <a:spcPct val="100000"/>
+              </a:lnSpc>
+              <a:spcBef>
+                <a:spcPts val="0"/>
+              </a:spcBef>
+              <a:spcAft>
+                <a:spcPts val="0"/>
+              </a:spcAft>
+              <a:buClr>
+                <a:schemeClr val="dk1"/>
+              </a:buClr>
+              <a:buSzPts val="2800"/>
+              <a:buFont typeface="Arial"/>
+              <a:buNone/>
+              <a:defRPr sz="2800" b="0" i="0" u="none" strike="noStrike" cap="none">
+                <a:solidFill>
+                  <a:schemeClr val="dk1"/>
+                </a:solidFill>
+                <a:latin typeface="Arial"/>
+                <a:ea typeface="Arial"/>
+                <a:cs typeface="Arial"/>
+                <a:sym typeface="Arial"/>
+              </a:defRPr>
+            </a:lvl3pPr>
+            <a:lvl4pPr marR="0" lvl="3" algn="l" rtl="0">
+              <a:lnSpc>
+                <a:spcPct val="100000"/>
+              </a:lnSpc>
+              <a:spcBef>
+                <a:spcPts val="0"/>
+              </a:spcBef>
+              <a:spcAft>
+                <a:spcPts val="0"/>
+              </a:spcAft>
+              <a:buClr>
+                <a:schemeClr val="dk1"/>
+              </a:buClr>
+              <a:buSzPts val="2800"/>
+              <a:buFont typeface="Arial"/>
+              <a:buNone/>
+              <a:defRPr sz="2800" b="0" i="0" u="none" strike="noStrike" cap="none">
+                <a:solidFill>
+                  <a:schemeClr val="dk1"/>
+                </a:solidFill>
+                <a:latin typeface="Arial"/>
+                <a:ea typeface="Arial"/>
+                <a:cs typeface="Arial"/>
+                <a:sym typeface="Arial"/>
+              </a:defRPr>
+            </a:lvl4pPr>
+            <a:lvl5pPr marR="0" lvl="4" algn="l" rtl="0">
+              <a:lnSpc>
+                <a:spcPct val="100000"/>
+              </a:lnSpc>
+              <a:spcBef>
+                <a:spcPts val="0"/>
+              </a:spcBef>
+              <a:spcAft>
+                <a:spcPts val="0"/>
+              </a:spcAft>
+              <a:buClr>
+                <a:schemeClr val="dk1"/>
+              </a:buClr>
+              <a:buSzPts val="2800"/>
+              <a:buFont typeface="Arial"/>
+              <a:buNone/>
+              <a:defRPr sz="2800" b="0" i="0" u="none" strike="noStrike" cap="none">
+                <a:solidFill>
+                  <a:schemeClr val="dk1"/>
+                </a:solidFill>
+                <a:latin typeface="Arial"/>
+                <a:ea typeface="Arial"/>
+                <a:cs typeface="Arial"/>
+                <a:sym typeface="Arial"/>
+              </a:defRPr>
+            </a:lvl5pPr>
+            <a:lvl6pPr marR="0" lvl="5" algn="l" rtl="0">
+              <a:lnSpc>
+                <a:spcPct val="100000"/>
+              </a:lnSpc>
+              <a:spcBef>
+                <a:spcPts val="0"/>
+              </a:spcBef>
+              <a:spcAft>
+                <a:spcPts val="0"/>
+              </a:spcAft>
+              <a:buClr>
+                <a:schemeClr val="dk1"/>
+              </a:buClr>
+              <a:buSzPts val="2800"/>
+              <a:buFont typeface="Arial"/>
+              <a:buNone/>
+              <a:defRPr sz="2800" b="0" i="0" u="none" strike="noStrike" cap="none">
+                <a:solidFill>
+                  <a:schemeClr val="dk1"/>
+                </a:solidFill>
+                <a:latin typeface="Arial"/>
+                <a:ea typeface="Arial"/>
+                <a:cs typeface="Arial"/>
+                <a:sym typeface="Arial"/>
+              </a:defRPr>
+            </a:lvl6pPr>
+            <a:lvl7pPr marR="0" lvl="6" algn="l" rtl="0">
+              <a:lnSpc>
+                <a:spcPct val="100000"/>
+              </a:lnSpc>
+              <a:spcBef>
+                <a:spcPts val="0"/>
+              </a:spcBef>
+              <a:spcAft>
+                <a:spcPts val="0"/>
+              </a:spcAft>
+              <a:buClr>
+                <a:schemeClr val="dk1"/>
+              </a:buClr>
+              <a:buSzPts val="2800"/>
+              <a:buFont typeface="Arial"/>
+              <a:buNone/>
+              <a:defRPr sz="2800" b="0" i="0" u="none" strike="noStrike" cap="none">
+                <a:solidFill>
+                  <a:schemeClr val="dk1"/>
+                </a:solidFill>
+                <a:latin typeface="Arial"/>
+                <a:ea typeface="Arial"/>
+                <a:cs typeface="Arial"/>
+                <a:sym typeface="Arial"/>
+              </a:defRPr>
+            </a:lvl7pPr>
+            <a:lvl8pPr marR="0" lvl="7" algn="l" rtl="0">
+              <a:lnSpc>
+                <a:spcPct val="100000"/>
+              </a:lnSpc>
+              <a:spcBef>
+                <a:spcPts val="0"/>
+              </a:spcBef>
+              <a:spcAft>
+                <a:spcPts val="0"/>
+              </a:spcAft>
+              <a:buClr>
+                <a:schemeClr val="dk1"/>
+              </a:buClr>
+              <a:buSzPts val="2800"/>
+              <a:buFont typeface="Arial"/>
+              <a:buNone/>
+              <a:defRPr sz="2800" b="0" i="0" u="none" strike="noStrike" cap="none">
+                <a:solidFill>
+                  <a:schemeClr val="dk1"/>
+                </a:solidFill>
+                <a:latin typeface="Arial"/>
+                <a:ea typeface="Arial"/>
+                <a:cs typeface="Arial"/>
+                <a:sym typeface="Arial"/>
+              </a:defRPr>
+            </a:lvl8pPr>
+            <a:lvl9pPr marR="0" lvl="8" algn="l" rtl="0">
+              <a:lnSpc>
+                <a:spcPct val="100000"/>
+              </a:lnSpc>
+              <a:spcBef>
+                <a:spcPts val="0"/>
+              </a:spcBef>
+              <a:spcAft>
+                <a:spcPts val="0"/>
+              </a:spcAft>
+              <a:buClr>
+                <a:schemeClr val="dk1"/>
+              </a:buClr>
+              <a:buSzPts val="2800"/>
+              <a:buFont typeface="Arial"/>
+              <a:buNone/>
+              <a:defRPr sz="2800" b="0" i="0" u="none" strike="noStrike" cap="none">
+                <a:solidFill>
+                  <a:schemeClr val="dk1"/>
+                </a:solidFill>
+                <a:latin typeface="Arial"/>
+                <a:ea typeface="Arial"/>
+                <a:cs typeface="Arial"/>
+                <a:sym typeface="Arial"/>
+              </a:defRPr>
+            </a:lvl9pPr>
+          </a:lstStyle>
+          <a:p>
+            <a:pPr>
+              <a:buSzPts val="2600"/>
+            </a:pPr>
+            <a:r>
+              <a:rPr lang="en-GB" sz="2000" b="1" dirty="0">
+                <a:solidFill>
+                  <a:srgbClr val="980000"/>
+                </a:solidFill>
+                <a:latin typeface="Montserrat"/>
+                <a:ea typeface="Montserrat"/>
+                <a:cs typeface="Montserrat"/>
+                <a:sym typeface="Montserrat"/>
+              </a:rPr>
+              <a:t>Development tools</a:t>
+            </a:r>
+          </a:p>
+        </p:txBody>
+      </p:sp>
+    </p:spTree>
+    <p:extLst>
+      <p:ext uri="{BB962C8B-B14F-4D97-AF65-F5344CB8AC3E}">
+        <p14:creationId xmlns:p14="http://schemas.microsoft.com/office/powerpoint/2010/main" val="1767989240"/>
+      </p:ext>
+    </p:extLst>
+  </p:cSld>
+  <p:clrMapOvr>
+    <a:masterClrMapping/>
+  </p:clrMapOvr>
+</p:sld>
+</file>
+
 <file path=ppt/theme/theme1.xml><?xml version="1.0" encoding="utf-8"?>
 <a:theme xmlns:a="http://schemas.openxmlformats.org/drawingml/2006/main" name="Simple Light">
   <a:themeElements>

</xml_diff>